<commit_message>
Updates to F# Agents talk for CoderFaire.
</commit_message>
<xml_diff>
--- a/Concurrent Applications - F# Agents/CodeMash - Concurrent Applications with F.pptx
+++ b/Concurrent Applications - F# Agents/CodeMash - Concurrent Applications with F.pptx
@@ -179,7 +179,7 @@
       </p14:sectionLst>
     </p:ext>
     <p:ext uri="{EFAFB233-063F-42B5-8137-9DF3F51BA10A}">
-      <p15:sldGuideLst xmlns:p15="http://schemas.microsoft.com/office/powerpoint/2012/main">
+      <p15:sldGuideLst xmlns:p15="http://schemas.microsoft.com/office/powerpoint/2012/main" xmlns="">
         <p15:guide id="3" pos="3816" userDrawn="1">
           <p15:clr>
             <a:srgbClr val="A4A3A4"/>
@@ -6534,22 +6534,22 @@
     </dgm:pt>
   </dgm:ptLst>
   <dgm:cxnLst>
-    <dgm:cxn modelId="{FE01A2F5-D236-4DD9-8EDC-9ED5BAA94017}" type="presOf" srcId="{C15F8DF1-D967-4513-A0FC-C8DE1B878A84}" destId="{A6C7CB61-6D7A-46EB-8DF6-8347375DF2F5}" srcOrd="0" destOrd="0" presId="urn:microsoft.com/office/officeart/2005/8/layout/vProcess5"/>
-    <dgm:cxn modelId="{7BFDADED-8C8B-4D0A-8AE2-36AB5C2700E1}" type="presOf" srcId="{541ABBF8-44C1-40F1-9F31-752600542949}" destId="{FADC7E14-6EF9-4BBB-BE19-FE73D1C9823A}" srcOrd="0" destOrd="0" presId="urn:microsoft.com/office/officeart/2005/8/layout/vProcess5"/>
+    <dgm:cxn modelId="{41935F1C-BE5C-47A3-8024-D7C0B1CC0383}" srcId="{541ABBF8-44C1-40F1-9F31-752600542949}" destId="{C15F8DF1-D967-4513-A0FC-C8DE1B878A84}" srcOrd="3" destOrd="0" parTransId="{E4E64C81-2BC6-4B4C-BD9C-B82B02BA2E70}" sibTransId="{FEBEBBE1-D807-4314-ABD8-222579FD076C}"/>
+    <dgm:cxn modelId="{B01C6DF5-79AD-4DB4-8054-82BC1CF75405}" type="presOf" srcId="{DF5DCB27-FD7C-4A61-98A9-D524796CED2A}" destId="{B56380F7-843D-48FD-AC1A-D1DBEDCF1B07}" srcOrd="0" destOrd="0" presId="urn:microsoft.com/office/officeart/2005/8/layout/vProcess5"/>
+    <dgm:cxn modelId="{F894CD99-3130-488C-9CE8-11BE58CFEDE7}" type="presOf" srcId="{FE041F02-4362-487F-AC22-4C979BC40B3E}" destId="{226C28B7-1C0F-49EC-B073-1B4B6DC5D86B}" srcOrd="0" destOrd="0" presId="urn:microsoft.com/office/officeart/2005/8/layout/vProcess5"/>
+    <dgm:cxn modelId="{87DF8E47-AFAF-4B45-A32C-98848C303ADF}" type="presOf" srcId="{C15F8DF1-D967-4513-A0FC-C8DE1B878A84}" destId="{549D0853-5AE8-4679-9E98-A83B0A72AB78}" srcOrd="1" destOrd="0" presId="urn:microsoft.com/office/officeart/2005/8/layout/vProcess5"/>
+    <dgm:cxn modelId="{EFDAF282-C039-4298-ABCF-32FE2C80B6D5}" type="presOf" srcId="{BF46AF84-6923-4D68-84C6-37BDA00586F4}" destId="{46B9EF4A-697D-4F93-A38F-E68DB7E4476D}" srcOrd="1" destOrd="0" presId="urn:microsoft.com/office/officeart/2005/8/layout/vProcess5"/>
+    <dgm:cxn modelId="{EA2AD2E1-A64C-4F31-89DD-0BF5CCF9F0FF}" srcId="{541ABBF8-44C1-40F1-9F31-752600542949}" destId="{FE041F02-4362-487F-AC22-4C979BC40B3E}" srcOrd="2" destOrd="0" parTransId="{DAAC4CFE-57F7-4D72-8F58-5597C090B545}" sibTransId="{F5CAB6D8-BFCF-42BB-B2B1-83CC2D4A4AF8}"/>
+    <dgm:cxn modelId="{D3D3C587-BD3E-49AB-BB66-E6D47FC99348}" type="presOf" srcId="{7777FCEF-13DD-49E4-8EDC-A2CCCF01573A}" destId="{F2539A5F-1E25-4AC9-8B24-A0563841837E}" srcOrd="0" destOrd="0" presId="urn:microsoft.com/office/officeart/2005/8/layout/vProcess5"/>
     <dgm:cxn modelId="{4CD36FAA-6ECB-4F1C-A531-44AA702F22D3}" srcId="{541ABBF8-44C1-40F1-9F31-752600542949}" destId="{DF5DCB27-FD7C-4A61-98A9-D524796CED2A}" srcOrd="0" destOrd="0" parTransId="{32A46A8A-7C27-4A78-8B3F-1B5A5F515058}" sibTransId="{7DD55F45-D3A3-4867-9A01-A8B956D6A7E1}"/>
     <dgm:cxn modelId="{6E7CB06A-35BD-4363-9F28-0AE3F85C262A}" srcId="{541ABBF8-44C1-40F1-9F31-752600542949}" destId="{BF46AF84-6923-4D68-84C6-37BDA00586F4}" srcOrd="1" destOrd="0" parTransId="{DB07A1EF-4B39-4948-A09D-B075C24BFF62}" sibTransId="{7777FCEF-13DD-49E4-8EDC-A2CCCF01573A}"/>
-    <dgm:cxn modelId="{D3D3C587-BD3E-49AB-BB66-E6D47FC99348}" type="presOf" srcId="{7777FCEF-13DD-49E4-8EDC-A2CCCF01573A}" destId="{F2539A5F-1E25-4AC9-8B24-A0563841837E}" srcOrd="0" destOrd="0" presId="urn:microsoft.com/office/officeart/2005/8/layout/vProcess5"/>
+    <dgm:cxn modelId="{E42AA482-6626-4733-BDD9-580FB7CDD4A3}" type="presOf" srcId="{FE041F02-4362-487F-AC22-4C979BC40B3E}" destId="{E0EE6CE4-2FAF-4F38-B231-42E0C040EC52}" srcOrd="1" destOrd="0" presId="urn:microsoft.com/office/officeart/2005/8/layout/vProcess5"/>
+    <dgm:cxn modelId="{4F8337EF-A6EC-44B2-891E-15700AE88CC1}" type="presOf" srcId="{BF46AF84-6923-4D68-84C6-37BDA00586F4}" destId="{FE590F36-70C5-4FE2-B49A-24F07CF41702}" srcOrd="0" destOrd="0" presId="urn:microsoft.com/office/officeart/2005/8/layout/vProcess5"/>
+    <dgm:cxn modelId="{4FDE4636-2AC6-4669-A971-F41B22F3C498}" type="presOf" srcId="{F5CAB6D8-BFCF-42BB-B2B1-83CC2D4A4AF8}" destId="{F04B7FFE-5806-44C7-86F3-D924A32EA1F0}" srcOrd="0" destOrd="0" presId="urn:microsoft.com/office/officeart/2005/8/layout/vProcess5"/>
+    <dgm:cxn modelId="{7BFDADED-8C8B-4D0A-8AE2-36AB5C2700E1}" type="presOf" srcId="{541ABBF8-44C1-40F1-9F31-752600542949}" destId="{FADC7E14-6EF9-4BBB-BE19-FE73D1C9823A}" srcOrd="0" destOrd="0" presId="urn:microsoft.com/office/officeart/2005/8/layout/vProcess5"/>
+    <dgm:cxn modelId="{ADF98626-BFD1-4F22-BACD-712EE885FBDA}" type="presOf" srcId="{7DD55F45-D3A3-4867-9A01-A8B956D6A7E1}" destId="{4C6629DC-ED83-4C24-918E-02A809AE514C}" srcOrd="0" destOrd="0" presId="urn:microsoft.com/office/officeart/2005/8/layout/vProcess5"/>
+    <dgm:cxn modelId="{FE01A2F5-D236-4DD9-8EDC-9ED5BAA94017}" type="presOf" srcId="{C15F8DF1-D967-4513-A0FC-C8DE1B878A84}" destId="{A6C7CB61-6D7A-46EB-8DF6-8347375DF2F5}" srcOrd="0" destOrd="0" presId="urn:microsoft.com/office/officeart/2005/8/layout/vProcess5"/>
     <dgm:cxn modelId="{1BA41405-CB27-4017-9782-5A85BE700911}" type="presOf" srcId="{DF5DCB27-FD7C-4A61-98A9-D524796CED2A}" destId="{F5AB6F67-7DDB-45B5-8A02-C7F07347A120}" srcOrd="1" destOrd="0" presId="urn:microsoft.com/office/officeart/2005/8/layout/vProcess5"/>
-    <dgm:cxn modelId="{B01C6DF5-79AD-4DB4-8054-82BC1CF75405}" type="presOf" srcId="{DF5DCB27-FD7C-4A61-98A9-D524796CED2A}" destId="{B56380F7-843D-48FD-AC1A-D1DBEDCF1B07}" srcOrd="0" destOrd="0" presId="urn:microsoft.com/office/officeart/2005/8/layout/vProcess5"/>
-    <dgm:cxn modelId="{4F8337EF-A6EC-44B2-891E-15700AE88CC1}" type="presOf" srcId="{BF46AF84-6923-4D68-84C6-37BDA00586F4}" destId="{FE590F36-70C5-4FE2-B49A-24F07CF41702}" srcOrd="0" destOrd="0" presId="urn:microsoft.com/office/officeart/2005/8/layout/vProcess5"/>
-    <dgm:cxn modelId="{EFDAF282-C039-4298-ABCF-32FE2C80B6D5}" type="presOf" srcId="{BF46AF84-6923-4D68-84C6-37BDA00586F4}" destId="{46B9EF4A-697D-4F93-A38F-E68DB7E4476D}" srcOrd="1" destOrd="0" presId="urn:microsoft.com/office/officeart/2005/8/layout/vProcess5"/>
-    <dgm:cxn modelId="{ADF98626-BFD1-4F22-BACD-712EE885FBDA}" type="presOf" srcId="{7DD55F45-D3A3-4867-9A01-A8B956D6A7E1}" destId="{4C6629DC-ED83-4C24-918E-02A809AE514C}" srcOrd="0" destOrd="0" presId="urn:microsoft.com/office/officeart/2005/8/layout/vProcess5"/>
-    <dgm:cxn modelId="{F894CD99-3130-488C-9CE8-11BE58CFEDE7}" type="presOf" srcId="{FE041F02-4362-487F-AC22-4C979BC40B3E}" destId="{226C28B7-1C0F-49EC-B073-1B4B6DC5D86B}" srcOrd="0" destOrd="0" presId="urn:microsoft.com/office/officeart/2005/8/layout/vProcess5"/>
-    <dgm:cxn modelId="{87DF8E47-AFAF-4B45-A32C-98848C303ADF}" type="presOf" srcId="{C15F8DF1-D967-4513-A0FC-C8DE1B878A84}" destId="{549D0853-5AE8-4679-9E98-A83B0A72AB78}" srcOrd="1" destOrd="0" presId="urn:microsoft.com/office/officeart/2005/8/layout/vProcess5"/>
-    <dgm:cxn modelId="{41935F1C-BE5C-47A3-8024-D7C0B1CC0383}" srcId="{541ABBF8-44C1-40F1-9F31-752600542949}" destId="{C15F8DF1-D967-4513-A0FC-C8DE1B878A84}" srcOrd="3" destOrd="0" parTransId="{E4E64C81-2BC6-4B4C-BD9C-B82B02BA2E70}" sibTransId="{FEBEBBE1-D807-4314-ABD8-222579FD076C}"/>
-    <dgm:cxn modelId="{EA2AD2E1-A64C-4F31-89DD-0BF5CCF9F0FF}" srcId="{541ABBF8-44C1-40F1-9F31-752600542949}" destId="{FE041F02-4362-487F-AC22-4C979BC40B3E}" srcOrd="2" destOrd="0" parTransId="{DAAC4CFE-57F7-4D72-8F58-5597C090B545}" sibTransId="{F5CAB6D8-BFCF-42BB-B2B1-83CC2D4A4AF8}"/>
-    <dgm:cxn modelId="{E42AA482-6626-4733-BDD9-580FB7CDD4A3}" type="presOf" srcId="{FE041F02-4362-487F-AC22-4C979BC40B3E}" destId="{E0EE6CE4-2FAF-4F38-B231-42E0C040EC52}" srcOrd="1" destOrd="0" presId="urn:microsoft.com/office/officeart/2005/8/layout/vProcess5"/>
-    <dgm:cxn modelId="{4FDE4636-2AC6-4669-A971-F41B22F3C498}" type="presOf" srcId="{F5CAB6D8-BFCF-42BB-B2B1-83CC2D4A4AF8}" destId="{F04B7FFE-5806-44C7-86F3-D924A32EA1F0}" srcOrd="0" destOrd="0" presId="urn:microsoft.com/office/officeart/2005/8/layout/vProcess5"/>
     <dgm:cxn modelId="{A6BCDED9-3C5C-4F11-ABA7-9F5331168204}" type="presParOf" srcId="{FADC7E14-6EF9-4BBB-BE19-FE73D1C9823A}" destId="{CA07782F-F0A1-44C3-BF8F-CA5B2D40B09B}" srcOrd="0" destOrd="0" presId="urn:microsoft.com/office/officeart/2005/8/layout/vProcess5"/>
     <dgm:cxn modelId="{5FF216A6-235D-48AF-96A5-D39DCD160200}" type="presParOf" srcId="{FADC7E14-6EF9-4BBB-BE19-FE73D1C9823A}" destId="{B56380F7-843D-48FD-AC1A-D1DBEDCF1B07}" srcOrd="1" destOrd="0" presId="urn:microsoft.com/office/officeart/2005/8/layout/vProcess5"/>
     <dgm:cxn modelId="{64F3B950-76B2-4D0C-8B53-C2CC6E511C8A}" type="presParOf" srcId="{FADC7E14-6EF9-4BBB-BE19-FE73D1C9823A}" destId="{FE590F36-70C5-4FE2-B49A-24F07CF41702}" srcOrd="2" destOrd="0" presId="urn:microsoft.com/office/officeart/2005/8/layout/vProcess5"/>
@@ -7374,6 +7374,568 @@
       <dsp:cNvGrpSpPr/>
     </dsp:nvGrpSpPr>
     <dsp:grpSpPr/>
+    <dsp:sp modelId="{B56380F7-843D-48FD-AC1A-D1DBEDCF1B07}">
+      <dsp:nvSpPr>
+        <dsp:cNvPr id="0" name=""/>
+        <dsp:cNvSpPr/>
+      </dsp:nvSpPr>
+      <dsp:spPr>
+        <a:xfrm>
+          <a:off x="0" y="0"/>
+          <a:ext cx="5852160" cy="1126680"/>
+        </a:xfrm>
+        <a:prstGeom prst="roundRect">
+          <a:avLst>
+            <a:gd name="adj" fmla="val 10000"/>
+          </a:avLst>
+        </a:prstGeom>
+        <a:solidFill>
+          <a:srgbClr val="FE7E00"/>
+        </a:solidFill>
+        <a:ln w="10795" cap="flat" cmpd="sng" algn="ctr">
+          <a:solidFill>
+            <a:schemeClr val="lt1">
+              <a:hueOff val="0"/>
+              <a:satOff val="0"/>
+              <a:lumOff val="0"/>
+              <a:alphaOff val="0"/>
+            </a:schemeClr>
+          </a:solidFill>
+          <a:prstDash val="solid"/>
+        </a:ln>
+        <a:effectLst/>
+      </dsp:spPr>
+      <dsp:style>
+        <a:lnRef idx="2">
+          <a:scrgbClr r="0" g="0" b="0"/>
+        </a:lnRef>
+        <a:fillRef idx="1">
+          <a:scrgbClr r="0" g="0" b="0"/>
+        </a:fillRef>
+        <a:effectRef idx="0">
+          <a:scrgbClr r="0" g="0" b="0"/>
+        </a:effectRef>
+        <a:fontRef idx="minor">
+          <a:schemeClr val="lt1"/>
+        </a:fontRef>
+      </dsp:style>
+      <dsp:txBody>
+        <a:bodyPr spcFirstLastPara="0" vert="horz" wrap="square" lIns="99060" tIns="99060" rIns="99060" bIns="99060" numCol="1" spcCol="1270" anchor="ctr" anchorCtr="0">
+          <a:noAutofit/>
+        </a:bodyPr>
+        <a:lstStyle/>
+        <a:p>
+          <a:pPr lvl="0" algn="l" defTabSz="1155700" rtl="0">
+            <a:lnSpc>
+              <a:spcPct val="90000"/>
+            </a:lnSpc>
+            <a:spcBef>
+              <a:spcPct val="0"/>
+            </a:spcBef>
+            <a:spcAft>
+              <a:spcPct val="35000"/>
+            </a:spcAft>
+          </a:pPr>
+          <a:r>
+            <a:rPr lang="en-US" sz="2600" kern="1200" dirty="0" smtClean="0">
+              <a:solidFill>
+                <a:schemeClr val="tx2"/>
+              </a:solidFill>
+            </a:rPr>
+            <a:t>dynamic creation of actors</a:t>
+          </a:r>
+          <a:endParaRPr lang="en-US" sz="2600" kern="1200" dirty="0">
+            <a:solidFill>
+              <a:schemeClr val="tx2"/>
+            </a:solidFill>
+          </a:endParaRPr>
+        </a:p>
+      </dsp:txBody>
+      <dsp:txXfrm>
+        <a:off x="32999" y="32999"/>
+        <a:ext cx="4541180" cy="1060682"/>
+      </dsp:txXfrm>
+    </dsp:sp>
+    <dsp:sp modelId="{FE590F36-70C5-4FE2-B49A-24F07CF41702}">
+      <dsp:nvSpPr>
+        <dsp:cNvPr id="0" name=""/>
+        <dsp:cNvSpPr/>
+      </dsp:nvSpPr>
+      <dsp:spPr>
+        <a:xfrm>
+          <a:off x="490118" y="1331531"/>
+          <a:ext cx="5852160" cy="1126680"/>
+        </a:xfrm>
+        <a:prstGeom prst="roundRect">
+          <a:avLst>
+            <a:gd name="adj" fmla="val 10000"/>
+          </a:avLst>
+        </a:prstGeom>
+        <a:solidFill>
+          <a:srgbClr val="FE7E00"/>
+        </a:solidFill>
+        <a:ln w="10795" cap="flat" cmpd="sng" algn="ctr">
+          <a:solidFill>
+            <a:schemeClr val="lt1">
+              <a:hueOff val="0"/>
+              <a:satOff val="0"/>
+              <a:lumOff val="0"/>
+              <a:alphaOff val="0"/>
+            </a:schemeClr>
+          </a:solidFill>
+          <a:prstDash val="solid"/>
+        </a:ln>
+        <a:effectLst/>
+      </dsp:spPr>
+      <dsp:style>
+        <a:lnRef idx="2">
+          <a:scrgbClr r="0" g="0" b="0"/>
+        </a:lnRef>
+        <a:fillRef idx="1">
+          <a:scrgbClr r="0" g="0" b="0"/>
+        </a:fillRef>
+        <a:effectRef idx="0">
+          <a:scrgbClr r="0" g="0" b="0"/>
+        </a:effectRef>
+        <a:fontRef idx="minor">
+          <a:schemeClr val="lt1"/>
+        </a:fontRef>
+      </dsp:style>
+      <dsp:txBody>
+        <a:bodyPr spcFirstLastPara="0" vert="horz" wrap="square" lIns="99060" tIns="99060" rIns="99060" bIns="99060" numCol="1" spcCol="1270" anchor="ctr" anchorCtr="0">
+          <a:noAutofit/>
+        </a:bodyPr>
+        <a:lstStyle/>
+        <a:p>
+          <a:pPr lvl="0" algn="l" defTabSz="1155700" rtl="0">
+            <a:lnSpc>
+              <a:spcPct val="90000"/>
+            </a:lnSpc>
+            <a:spcBef>
+              <a:spcPct val="0"/>
+            </a:spcBef>
+            <a:spcAft>
+              <a:spcPct val="35000"/>
+            </a:spcAft>
+          </a:pPr>
+          <a:r>
+            <a:rPr lang="en-US" sz="2600" kern="1200" dirty="0" smtClean="0">
+              <a:solidFill>
+                <a:schemeClr val="tx2"/>
+              </a:solidFill>
+            </a:rPr>
+            <a:t>inclusion of actor addresses in messages</a:t>
+          </a:r>
+          <a:endParaRPr lang="en-US" sz="2600" kern="1200" dirty="0">
+            <a:solidFill>
+              <a:schemeClr val="tx2"/>
+            </a:solidFill>
+          </a:endParaRPr>
+        </a:p>
+      </dsp:txBody>
+      <dsp:txXfrm>
+        <a:off x="523117" y="1364530"/>
+        <a:ext cx="4563701" cy="1060682"/>
+      </dsp:txXfrm>
+    </dsp:sp>
+    <dsp:sp modelId="{226C28B7-1C0F-49EC-B073-1B4B6DC5D86B}">
+      <dsp:nvSpPr>
+        <dsp:cNvPr id="0" name=""/>
+        <dsp:cNvSpPr/>
+      </dsp:nvSpPr>
+      <dsp:spPr>
+        <a:xfrm>
+          <a:off x="972921" y="2663063"/>
+          <a:ext cx="5852160" cy="1126680"/>
+        </a:xfrm>
+        <a:prstGeom prst="roundRect">
+          <a:avLst>
+            <a:gd name="adj" fmla="val 10000"/>
+          </a:avLst>
+        </a:prstGeom>
+        <a:solidFill>
+          <a:srgbClr val="FE7E00"/>
+        </a:solidFill>
+        <a:ln w="10795" cap="flat" cmpd="sng" algn="ctr">
+          <a:solidFill>
+            <a:schemeClr val="lt1">
+              <a:hueOff val="0"/>
+              <a:satOff val="0"/>
+              <a:lumOff val="0"/>
+              <a:alphaOff val="0"/>
+            </a:schemeClr>
+          </a:solidFill>
+          <a:prstDash val="solid"/>
+        </a:ln>
+        <a:effectLst/>
+      </dsp:spPr>
+      <dsp:style>
+        <a:lnRef idx="2">
+          <a:scrgbClr r="0" g="0" b="0"/>
+        </a:lnRef>
+        <a:fillRef idx="1">
+          <a:scrgbClr r="0" g="0" b="0"/>
+        </a:fillRef>
+        <a:effectRef idx="0">
+          <a:scrgbClr r="0" g="0" b="0"/>
+        </a:effectRef>
+        <a:fontRef idx="minor">
+          <a:schemeClr val="lt1"/>
+        </a:fontRef>
+      </dsp:style>
+      <dsp:txBody>
+        <a:bodyPr spcFirstLastPara="0" vert="horz" wrap="square" lIns="99060" tIns="99060" rIns="99060" bIns="99060" numCol="1" spcCol="1270" anchor="ctr" anchorCtr="0">
+          <a:noAutofit/>
+        </a:bodyPr>
+        <a:lstStyle/>
+        <a:p>
+          <a:pPr lvl="0" algn="l" defTabSz="1155700" rtl="0">
+            <a:lnSpc>
+              <a:spcPct val="90000"/>
+            </a:lnSpc>
+            <a:spcBef>
+              <a:spcPct val="0"/>
+            </a:spcBef>
+            <a:spcAft>
+              <a:spcPct val="35000"/>
+            </a:spcAft>
+          </a:pPr>
+          <a:r>
+            <a:rPr lang="en-US" sz="2600" kern="1200" dirty="0" smtClean="0">
+              <a:solidFill>
+                <a:schemeClr val="tx2"/>
+              </a:solidFill>
+            </a:rPr>
+            <a:t>interaction only through direct asynchronous message passing </a:t>
+          </a:r>
+          <a:endParaRPr lang="en-US" sz="2600" kern="1200" dirty="0">
+            <a:solidFill>
+              <a:schemeClr val="tx2"/>
+            </a:solidFill>
+          </a:endParaRPr>
+        </a:p>
+      </dsp:txBody>
+      <dsp:txXfrm>
+        <a:off x="1005920" y="2696062"/>
+        <a:ext cx="4571016" cy="1060682"/>
+      </dsp:txXfrm>
+    </dsp:sp>
+    <dsp:sp modelId="{A6C7CB61-6D7A-46EB-8DF6-8347375DF2F5}">
+      <dsp:nvSpPr>
+        <dsp:cNvPr id="0" name=""/>
+        <dsp:cNvSpPr/>
+      </dsp:nvSpPr>
+      <dsp:spPr>
+        <a:xfrm>
+          <a:off x="1463039" y="3994594"/>
+          <a:ext cx="5852160" cy="1126680"/>
+        </a:xfrm>
+        <a:prstGeom prst="roundRect">
+          <a:avLst>
+            <a:gd name="adj" fmla="val 10000"/>
+          </a:avLst>
+        </a:prstGeom>
+        <a:solidFill>
+          <a:srgbClr val="FE7E00"/>
+        </a:solidFill>
+        <a:ln w="10795" cap="flat" cmpd="sng" algn="ctr">
+          <a:solidFill>
+            <a:schemeClr val="lt1">
+              <a:hueOff val="0"/>
+              <a:satOff val="0"/>
+              <a:lumOff val="0"/>
+              <a:alphaOff val="0"/>
+            </a:schemeClr>
+          </a:solidFill>
+          <a:prstDash val="solid"/>
+        </a:ln>
+        <a:effectLst/>
+      </dsp:spPr>
+      <dsp:style>
+        <a:lnRef idx="2">
+          <a:scrgbClr r="0" g="0" b="0"/>
+        </a:lnRef>
+        <a:fillRef idx="1">
+          <a:scrgbClr r="0" g="0" b="0"/>
+        </a:fillRef>
+        <a:effectRef idx="0">
+          <a:scrgbClr r="0" g="0" b="0"/>
+        </a:effectRef>
+        <a:fontRef idx="minor">
+          <a:schemeClr val="lt1"/>
+        </a:fontRef>
+      </dsp:style>
+      <dsp:txBody>
+        <a:bodyPr spcFirstLastPara="0" vert="horz" wrap="square" lIns="99060" tIns="99060" rIns="99060" bIns="99060" numCol="1" spcCol="1270" anchor="ctr" anchorCtr="0">
+          <a:noAutofit/>
+        </a:bodyPr>
+        <a:lstStyle/>
+        <a:p>
+          <a:pPr lvl="0" algn="l" defTabSz="1155700" rtl="0">
+            <a:lnSpc>
+              <a:spcPct val="90000"/>
+            </a:lnSpc>
+            <a:spcBef>
+              <a:spcPct val="0"/>
+            </a:spcBef>
+            <a:spcAft>
+              <a:spcPct val="35000"/>
+            </a:spcAft>
+          </a:pPr>
+          <a:r>
+            <a:rPr lang="en-US" sz="2600" kern="1200" dirty="0" smtClean="0">
+              <a:solidFill>
+                <a:schemeClr val="tx2"/>
+              </a:solidFill>
+            </a:rPr>
+            <a:t>no restriction on message arrival order</a:t>
+          </a:r>
+          <a:endParaRPr lang="en-US" sz="2600" kern="1200" dirty="0">
+            <a:solidFill>
+              <a:schemeClr val="tx2"/>
+            </a:solidFill>
+          </a:endParaRPr>
+        </a:p>
+      </dsp:txBody>
+      <dsp:txXfrm>
+        <a:off x="1496038" y="4027593"/>
+        <a:ext cx="4563701" cy="1060682"/>
+      </dsp:txXfrm>
+    </dsp:sp>
+    <dsp:sp modelId="{4C6629DC-ED83-4C24-918E-02A809AE514C}">
+      <dsp:nvSpPr>
+        <dsp:cNvPr id="0" name=""/>
+        <dsp:cNvSpPr/>
+      </dsp:nvSpPr>
+      <dsp:spPr>
+        <a:xfrm>
+          <a:off x="5119817" y="862934"/>
+          <a:ext cx="732342" cy="732342"/>
+        </a:xfrm>
+        <a:prstGeom prst="downArrow">
+          <a:avLst>
+            <a:gd name="adj1" fmla="val 55000"/>
+            <a:gd name="adj2" fmla="val 45000"/>
+          </a:avLst>
+        </a:prstGeom>
+        <a:solidFill>
+          <a:schemeClr val="accent2">
+            <a:alpha val="90000"/>
+            <a:tint val="40000"/>
+            <a:hueOff val="0"/>
+            <a:satOff val="0"/>
+            <a:lumOff val="0"/>
+            <a:alphaOff val="0"/>
+          </a:schemeClr>
+        </a:solidFill>
+        <a:ln w="10795" cap="flat" cmpd="sng" algn="ctr">
+          <a:solidFill>
+            <a:schemeClr val="accent2">
+              <a:alpha val="90000"/>
+              <a:tint val="40000"/>
+              <a:hueOff val="0"/>
+              <a:satOff val="0"/>
+              <a:lumOff val="0"/>
+              <a:alphaOff val="0"/>
+            </a:schemeClr>
+          </a:solidFill>
+          <a:prstDash val="solid"/>
+        </a:ln>
+        <a:effectLst/>
+      </dsp:spPr>
+      <dsp:style>
+        <a:lnRef idx="2">
+          <a:scrgbClr r="0" g="0" b="0"/>
+        </a:lnRef>
+        <a:fillRef idx="1">
+          <a:scrgbClr r="0" g="0" b="0"/>
+        </a:fillRef>
+        <a:effectRef idx="0">
+          <a:scrgbClr r="0" g="0" b="0"/>
+        </a:effectRef>
+        <a:fontRef idx="minor"/>
+      </dsp:style>
+      <dsp:txBody>
+        <a:bodyPr spcFirstLastPara="0" vert="horz" wrap="square" lIns="41910" tIns="41910" rIns="41910" bIns="41910" numCol="1" spcCol="1270" anchor="ctr" anchorCtr="0">
+          <a:noAutofit/>
+        </a:bodyPr>
+        <a:lstStyle/>
+        <a:p>
+          <a:pPr lvl="0" algn="ctr" defTabSz="1466850">
+            <a:lnSpc>
+              <a:spcPct val="90000"/>
+            </a:lnSpc>
+            <a:spcBef>
+              <a:spcPct val="0"/>
+            </a:spcBef>
+            <a:spcAft>
+              <a:spcPct val="35000"/>
+            </a:spcAft>
+          </a:pPr>
+          <a:endParaRPr lang="en-US" sz="3300" kern="1200"/>
+        </a:p>
+      </dsp:txBody>
+      <dsp:txXfrm>
+        <a:off x="5284594" y="862934"/>
+        <a:ext cx="402788" cy="551087"/>
+      </dsp:txXfrm>
+    </dsp:sp>
+    <dsp:sp modelId="{F2539A5F-1E25-4AC9-8B24-A0563841837E}">
+      <dsp:nvSpPr>
+        <dsp:cNvPr id="0" name=""/>
+        <dsp:cNvSpPr/>
+      </dsp:nvSpPr>
+      <dsp:spPr>
+        <a:xfrm>
+          <a:off x="5609936" y="2194466"/>
+          <a:ext cx="732342" cy="732342"/>
+        </a:xfrm>
+        <a:prstGeom prst="downArrow">
+          <a:avLst>
+            <a:gd name="adj1" fmla="val 55000"/>
+            <a:gd name="adj2" fmla="val 45000"/>
+          </a:avLst>
+        </a:prstGeom>
+        <a:solidFill>
+          <a:schemeClr val="accent2">
+            <a:alpha val="90000"/>
+            <a:tint val="40000"/>
+            <a:hueOff val="0"/>
+            <a:satOff val="0"/>
+            <a:lumOff val="0"/>
+            <a:alphaOff val="0"/>
+          </a:schemeClr>
+        </a:solidFill>
+        <a:ln w="10795" cap="flat" cmpd="sng" algn="ctr">
+          <a:solidFill>
+            <a:schemeClr val="accent2">
+              <a:alpha val="90000"/>
+              <a:tint val="40000"/>
+              <a:hueOff val="0"/>
+              <a:satOff val="0"/>
+              <a:lumOff val="0"/>
+              <a:alphaOff val="0"/>
+            </a:schemeClr>
+          </a:solidFill>
+          <a:prstDash val="solid"/>
+        </a:ln>
+        <a:effectLst/>
+      </dsp:spPr>
+      <dsp:style>
+        <a:lnRef idx="2">
+          <a:scrgbClr r="0" g="0" b="0"/>
+        </a:lnRef>
+        <a:fillRef idx="1">
+          <a:scrgbClr r="0" g="0" b="0"/>
+        </a:fillRef>
+        <a:effectRef idx="0">
+          <a:scrgbClr r="0" g="0" b="0"/>
+        </a:effectRef>
+        <a:fontRef idx="minor"/>
+      </dsp:style>
+      <dsp:txBody>
+        <a:bodyPr spcFirstLastPara="0" vert="horz" wrap="square" lIns="41910" tIns="41910" rIns="41910" bIns="41910" numCol="1" spcCol="1270" anchor="ctr" anchorCtr="0">
+          <a:noAutofit/>
+        </a:bodyPr>
+        <a:lstStyle/>
+        <a:p>
+          <a:pPr lvl="0" algn="ctr" defTabSz="1466850">
+            <a:lnSpc>
+              <a:spcPct val="90000"/>
+            </a:lnSpc>
+            <a:spcBef>
+              <a:spcPct val="0"/>
+            </a:spcBef>
+            <a:spcAft>
+              <a:spcPct val="35000"/>
+            </a:spcAft>
+          </a:pPr>
+          <a:endParaRPr lang="en-US" sz="3300" kern="1200"/>
+        </a:p>
+      </dsp:txBody>
+      <dsp:txXfrm>
+        <a:off x="5774713" y="2194466"/>
+        <a:ext cx="402788" cy="551087"/>
+      </dsp:txXfrm>
+    </dsp:sp>
+    <dsp:sp modelId="{F04B7FFE-5806-44C7-86F3-D924A32EA1F0}">
+      <dsp:nvSpPr>
+        <dsp:cNvPr id="0" name=""/>
+        <dsp:cNvSpPr/>
+      </dsp:nvSpPr>
+      <dsp:spPr>
+        <a:xfrm>
+          <a:off x="6092739" y="3525997"/>
+          <a:ext cx="732342" cy="732342"/>
+        </a:xfrm>
+        <a:prstGeom prst="downArrow">
+          <a:avLst>
+            <a:gd name="adj1" fmla="val 55000"/>
+            <a:gd name="adj2" fmla="val 45000"/>
+          </a:avLst>
+        </a:prstGeom>
+        <a:solidFill>
+          <a:schemeClr val="accent2">
+            <a:alpha val="90000"/>
+            <a:tint val="40000"/>
+            <a:hueOff val="0"/>
+            <a:satOff val="0"/>
+            <a:lumOff val="0"/>
+            <a:alphaOff val="0"/>
+          </a:schemeClr>
+        </a:solidFill>
+        <a:ln w="10795" cap="flat" cmpd="sng" algn="ctr">
+          <a:solidFill>
+            <a:schemeClr val="accent2">
+              <a:alpha val="90000"/>
+              <a:tint val="40000"/>
+              <a:hueOff val="0"/>
+              <a:satOff val="0"/>
+              <a:lumOff val="0"/>
+              <a:alphaOff val="0"/>
+            </a:schemeClr>
+          </a:solidFill>
+          <a:prstDash val="solid"/>
+        </a:ln>
+        <a:effectLst/>
+      </dsp:spPr>
+      <dsp:style>
+        <a:lnRef idx="2">
+          <a:scrgbClr r="0" g="0" b="0"/>
+        </a:lnRef>
+        <a:fillRef idx="1">
+          <a:scrgbClr r="0" g="0" b="0"/>
+        </a:fillRef>
+        <a:effectRef idx="0">
+          <a:scrgbClr r="0" g="0" b="0"/>
+        </a:effectRef>
+        <a:fontRef idx="minor"/>
+      </dsp:style>
+      <dsp:txBody>
+        <a:bodyPr spcFirstLastPara="0" vert="horz" wrap="square" lIns="41910" tIns="41910" rIns="41910" bIns="41910" numCol="1" spcCol="1270" anchor="ctr" anchorCtr="0">
+          <a:noAutofit/>
+        </a:bodyPr>
+        <a:lstStyle/>
+        <a:p>
+          <a:pPr lvl="0" algn="ctr" defTabSz="1466850">
+            <a:lnSpc>
+              <a:spcPct val="90000"/>
+            </a:lnSpc>
+            <a:spcBef>
+              <a:spcPct val="0"/>
+            </a:spcBef>
+            <a:spcAft>
+              <a:spcPct val="35000"/>
+            </a:spcAft>
+          </a:pPr>
+          <a:endParaRPr lang="en-US" sz="3300" kern="1200"/>
+        </a:p>
+      </dsp:txBody>
+      <dsp:txXfrm>
+        <a:off x="6257516" y="3525997"/>
+        <a:ext cx="402788" cy="551087"/>
+      </dsp:txXfrm>
+    </dsp:sp>
   </dsp:spTree>
 </dsp:drawing>
 </file>
@@ -7386,6 +7948,1228 @@
       <dsp:cNvGrpSpPr/>
     </dsp:nvGrpSpPr>
     <dsp:grpSpPr/>
+    <dsp:sp modelId="{DAB28311-038B-45FC-8929-FF7258AF2DA7}">
+      <dsp:nvSpPr>
+        <dsp:cNvPr id="0" name=""/>
+        <dsp:cNvSpPr/>
+      </dsp:nvSpPr>
+      <dsp:spPr>
+        <a:xfrm>
+          <a:off x="147381" y="1039829"/>
+          <a:ext cx="2162257" cy="712562"/>
+        </a:xfrm>
+        <a:prstGeom prst="rect">
+          <a:avLst/>
+        </a:prstGeom>
+        <a:noFill/>
+        <a:ln>
+          <a:noFill/>
+        </a:ln>
+        <a:effectLst/>
+      </dsp:spPr>
+      <dsp:style>
+        <a:lnRef idx="0">
+          <a:scrgbClr r="0" g="0" b="0"/>
+        </a:lnRef>
+        <a:fillRef idx="0">
+          <a:scrgbClr r="0" g="0" b="0"/>
+        </a:fillRef>
+        <a:effectRef idx="0">
+          <a:scrgbClr r="0" g="0" b="0"/>
+        </a:effectRef>
+        <a:fontRef idx="minor"/>
+      </dsp:style>
+      <dsp:txBody>
+        <a:bodyPr spcFirstLastPara="0" vert="horz" wrap="square" lIns="45720" tIns="45720" rIns="45720" bIns="45720" numCol="1" spcCol="1270" anchor="ctr" anchorCtr="0">
+          <a:noAutofit/>
+        </a:bodyPr>
+        <a:lstStyle/>
+        <a:p>
+          <a:pPr lvl="0" algn="ctr" defTabSz="1600200">
+            <a:lnSpc>
+              <a:spcPct val="90000"/>
+            </a:lnSpc>
+            <a:spcBef>
+              <a:spcPct val="0"/>
+            </a:spcBef>
+            <a:spcAft>
+              <a:spcPct val="35000"/>
+            </a:spcAft>
+          </a:pPr>
+          <a:r>
+            <a:rPr lang="en-US" sz="3600" kern="1200" dirty="0" smtClean="0">
+              <a:solidFill>
+                <a:schemeClr val="tx2"/>
+              </a:solidFill>
+            </a:rPr>
+            <a:t>Everything</a:t>
+          </a:r>
+          <a:endParaRPr lang="en-US" sz="3600" kern="1200" dirty="0">
+            <a:solidFill>
+              <a:schemeClr val="tx2"/>
+            </a:solidFill>
+          </a:endParaRPr>
+        </a:p>
+      </dsp:txBody>
+      <dsp:txXfrm>
+        <a:off x="147381" y="1039829"/>
+        <a:ext cx="2162257" cy="712562"/>
+      </dsp:txXfrm>
+    </dsp:sp>
+    <dsp:sp modelId="{311A4562-3D0A-4421-A676-7540D5C85F5D}">
+      <dsp:nvSpPr>
+        <dsp:cNvPr id="0" name=""/>
+        <dsp:cNvSpPr/>
+      </dsp:nvSpPr>
+      <dsp:spPr>
+        <a:xfrm>
+          <a:off x="144924" y="823112"/>
+          <a:ext cx="171997" cy="171997"/>
+        </a:xfrm>
+        <a:prstGeom prst="ellipse">
+          <a:avLst/>
+        </a:prstGeom>
+        <a:solidFill>
+          <a:schemeClr val="accent2">
+            <a:hueOff val="0"/>
+            <a:satOff val="0"/>
+            <a:lumOff val="0"/>
+            <a:alphaOff val="0"/>
+          </a:schemeClr>
+        </a:solidFill>
+        <a:ln>
+          <a:noFill/>
+        </a:ln>
+        <a:effectLst/>
+        <a:scene3d>
+          <a:camera prst="orthographicFront"/>
+          <a:lightRig rig="threePt" dir="t">
+            <a:rot lat="0" lon="0" rev="7500000"/>
+          </a:lightRig>
+        </a:scene3d>
+        <a:sp3d prstMaterial="plastic">
+          <a:bevelT w="127000" h="25400" prst="relaxedInset"/>
+        </a:sp3d>
+      </dsp:spPr>
+      <dsp:style>
+        <a:lnRef idx="0">
+          <a:scrgbClr r="0" g="0" b="0"/>
+        </a:lnRef>
+        <a:fillRef idx="3">
+          <a:scrgbClr r="0" g="0" b="0"/>
+        </a:fillRef>
+        <a:effectRef idx="2">
+          <a:scrgbClr r="0" g="0" b="0"/>
+        </a:effectRef>
+        <a:fontRef idx="minor">
+          <a:schemeClr val="lt1"/>
+        </a:fontRef>
+      </dsp:style>
+    </dsp:sp>
+    <dsp:sp modelId="{C5ABDC77-009D-4807-830B-CC65290487AF}">
+      <dsp:nvSpPr>
+        <dsp:cNvPr id="0" name=""/>
+        <dsp:cNvSpPr/>
+      </dsp:nvSpPr>
+      <dsp:spPr>
+        <a:xfrm>
+          <a:off x="265322" y="582315"/>
+          <a:ext cx="171997" cy="171997"/>
+        </a:xfrm>
+        <a:prstGeom prst="ellipse">
+          <a:avLst/>
+        </a:prstGeom>
+        <a:solidFill>
+          <a:schemeClr val="accent2">
+            <a:hueOff val="0"/>
+            <a:satOff val="0"/>
+            <a:lumOff val="0"/>
+            <a:alphaOff val="0"/>
+          </a:schemeClr>
+        </a:solidFill>
+        <a:ln>
+          <a:noFill/>
+        </a:ln>
+        <a:effectLst/>
+        <a:scene3d>
+          <a:camera prst="orthographicFront"/>
+          <a:lightRig rig="threePt" dir="t">
+            <a:rot lat="0" lon="0" rev="7500000"/>
+          </a:lightRig>
+        </a:scene3d>
+        <a:sp3d prstMaterial="plastic">
+          <a:bevelT w="127000" h="25400" prst="relaxedInset"/>
+        </a:sp3d>
+      </dsp:spPr>
+      <dsp:style>
+        <a:lnRef idx="0">
+          <a:scrgbClr r="0" g="0" b="0"/>
+        </a:lnRef>
+        <a:fillRef idx="3">
+          <a:scrgbClr r="0" g="0" b="0"/>
+        </a:fillRef>
+        <a:effectRef idx="2">
+          <a:scrgbClr r="0" g="0" b="0"/>
+        </a:effectRef>
+        <a:fontRef idx="minor">
+          <a:schemeClr val="lt1"/>
+        </a:fontRef>
+      </dsp:style>
+    </dsp:sp>
+    <dsp:sp modelId="{0DD74683-1B22-4086-8302-5BF4B4594961}">
+      <dsp:nvSpPr>
+        <dsp:cNvPr id="0" name=""/>
+        <dsp:cNvSpPr/>
+      </dsp:nvSpPr>
+      <dsp:spPr>
+        <a:xfrm>
+          <a:off x="554278" y="630475"/>
+          <a:ext cx="270282" cy="270282"/>
+        </a:xfrm>
+        <a:prstGeom prst="ellipse">
+          <a:avLst/>
+        </a:prstGeom>
+        <a:solidFill>
+          <a:schemeClr val="accent2">
+            <a:hueOff val="0"/>
+            <a:satOff val="0"/>
+            <a:lumOff val="0"/>
+            <a:alphaOff val="0"/>
+          </a:schemeClr>
+        </a:solidFill>
+        <a:ln>
+          <a:noFill/>
+        </a:ln>
+        <a:effectLst/>
+        <a:scene3d>
+          <a:camera prst="orthographicFront"/>
+          <a:lightRig rig="threePt" dir="t">
+            <a:rot lat="0" lon="0" rev="7500000"/>
+          </a:lightRig>
+        </a:scene3d>
+        <a:sp3d prstMaterial="plastic">
+          <a:bevelT w="127000" h="25400" prst="relaxedInset"/>
+        </a:sp3d>
+      </dsp:spPr>
+      <dsp:style>
+        <a:lnRef idx="0">
+          <a:scrgbClr r="0" g="0" b="0"/>
+        </a:lnRef>
+        <a:fillRef idx="3">
+          <a:scrgbClr r="0" g="0" b="0"/>
+        </a:fillRef>
+        <a:effectRef idx="2">
+          <a:scrgbClr r="0" g="0" b="0"/>
+        </a:effectRef>
+        <a:fontRef idx="minor">
+          <a:schemeClr val="lt1"/>
+        </a:fontRef>
+      </dsp:style>
+    </dsp:sp>
+    <dsp:sp modelId="{1C9E7B99-13FC-4D72-AA39-5E1E64284A39}">
+      <dsp:nvSpPr>
+        <dsp:cNvPr id="0" name=""/>
+        <dsp:cNvSpPr/>
+      </dsp:nvSpPr>
+      <dsp:spPr>
+        <a:xfrm>
+          <a:off x="795075" y="365598"/>
+          <a:ext cx="171997" cy="171997"/>
+        </a:xfrm>
+        <a:prstGeom prst="ellipse">
+          <a:avLst/>
+        </a:prstGeom>
+        <a:solidFill>
+          <a:schemeClr val="accent2">
+            <a:hueOff val="0"/>
+            <a:satOff val="0"/>
+            <a:lumOff val="0"/>
+            <a:alphaOff val="0"/>
+          </a:schemeClr>
+        </a:solidFill>
+        <a:ln>
+          <a:noFill/>
+        </a:ln>
+        <a:effectLst/>
+        <a:scene3d>
+          <a:camera prst="orthographicFront"/>
+          <a:lightRig rig="threePt" dir="t">
+            <a:rot lat="0" lon="0" rev="7500000"/>
+          </a:lightRig>
+        </a:scene3d>
+        <a:sp3d prstMaterial="plastic">
+          <a:bevelT w="127000" h="25400" prst="relaxedInset"/>
+        </a:sp3d>
+      </dsp:spPr>
+      <dsp:style>
+        <a:lnRef idx="0">
+          <a:scrgbClr r="0" g="0" b="0"/>
+        </a:lnRef>
+        <a:fillRef idx="3">
+          <a:scrgbClr r="0" g="0" b="0"/>
+        </a:fillRef>
+        <a:effectRef idx="2">
+          <a:scrgbClr r="0" g="0" b="0"/>
+        </a:effectRef>
+        <a:fontRef idx="minor">
+          <a:schemeClr val="lt1"/>
+        </a:fontRef>
+      </dsp:style>
+    </dsp:sp>
+    <dsp:sp modelId="{3382167D-3C5E-4800-8A1C-F82F8D949528}">
+      <dsp:nvSpPr>
+        <dsp:cNvPr id="0" name=""/>
+        <dsp:cNvSpPr/>
+      </dsp:nvSpPr>
+      <dsp:spPr>
+        <a:xfrm>
+          <a:off x="1108111" y="269279"/>
+          <a:ext cx="171997" cy="171997"/>
+        </a:xfrm>
+        <a:prstGeom prst="ellipse">
+          <a:avLst/>
+        </a:prstGeom>
+        <a:solidFill>
+          <a:schemeClr val="accent2">
+            <a:hueOff val="0"/>
+            <a:satOff val="0"/>
+            <a:lumOff val="0"/>
+            <a:alphaOff val="0"/>
+          </a:schemeClr>
+        </a:solidFill>
+        <a:ln>
+          <a:noFill/>
+        </a:ln>
+        <a:effectLst/>
+        <a:scene3d>
+          <a:camera prst="orthographicFront"/>
+          <a:lightRig rig="threePt" dir="t">
+            <a:rot lat="0" lon="0" rev="7500000"/>
+          </a:lightRig>
+        </a:scene3d>
+        <a:sp3d prstMaterial="plastic">
+          <a:bevelT w="127000" h="25400" prst="relaxedInset"/>
+        </a:sp3d>
+      </dsp:spPr>
+      <dsp:style>
+        <a:lnRef idx="0">
+          <a:scrgbClr r="0" g="0" b="0"/>
+        </a:lnRef>
+        <a:fillRef idx="3">
+          <a:scrgbClr r="0" g="0" b="0"/>
+        </a:fillRef>
+        <a:effectRef idx="2">
+          <a:scrgbClr r="0" g="0" b="0"/>
+        </a:effectRef>
+        <a:fontRef idx="minor">
+          <a:schemeClr val="lt1"/>
+        </a:fontRef>
+      </dsp:style>
+    </dsp:sp>
+    <dsp:sp modelId="{82EEED91-CCBD-47AC-B4CF-24C3A94EAC42}">
+      <dsp:nvSpPr>
+        <dsp:cNvPr id="0" name=""/>
+        <dsp:cNvSpPr/>
+      </dsp:nvSpPr>
+      <dsp:spPr>
+        <a:xfrm>
+          <a:off x="1493386" y="437837"/>
+          <a:ext cx="171997" cy="171997"/>
+        </a:xfrm>
+        <a:prstGeom prst="ellipse">
+          <a:avLst/>
+        </a:prstGeom>
+        <a:solidFill>
+          <a:schemeClr val="accent2">
+            <a:hueOff val="0"/>
+            <a:satOff val="0"/>
+            <a:lumOff val="0"/>
+            <a:alphaOff val="0"/>
+          </a:schemeClr>
+        </a:solidFill>
+        <a:ln>
+          <a:noFill/>
+        </a:ln>
+        <a:effectLst/>
+        <a:scene3d>
+          <a:camera prst="orthographicFront"/>
+          <a:lightRig rig="threePt" dir="t">
+            <a:rot lat="0" lon="0" rev="7500000"/>
+          </a:lightRig>
+        </a:scene3d>
+        <a:sp3d prstMaterial="plastic">
+          <a:bevelT w="127000" h="25400" prst="relaxedInset"/>
+        </a:sp3d>
+      </dsp:spPr>
+      <dsp:style>
+        <a:lnRef idx="0">
+          <a:scrgbClr r="0" g="0" b="0"/>
+        </a:lnRef>
+        <a:fillRef idx="3">
+          <a:scrgbClr r="0" g="0" b="0"/>
+        </a:fillRef>
+        <a:effectRef idx="2">
+          <a:scrgbClr r="0" g="0" b="0"/>
+        </a:effectRef>
+        <a:fontRef idx="minor">
+          <a:schemeClr val="lt1"/>
+        </a:fontRef>
+      </dsp:style>
+    </dsp:sp>
+    <dsp:sp modelId="{3AFE6E28-4143-4E44-BDC5-6912FC08476C}">
+      <dsp:nvSpPr>
+        <dsp:cNvPr id="0" name=""/>
+        <dsp:cNvSpPr/>
+      </dsp:nvSpPr>
+      <dsp:spPr>
+        <a:xfrm>
+          <a:off x="1734183" y="558236"/>
+          <a:ext cx="270282" cy="270282"/>
+        </a:xfrm>
+        <a:prstGeom prst="ellipse">
+          <a:avLst/>
+        </a:prstGeom>
+        <a:solidFill>
+          <a:schemeClr val="accent2">
+            <a:hueOff val="0"/>
+            <a:satOff val="0"/>
+            <a:lumOff val="0"/>
+            <a:alphaOff val="0"/>
+          </a:schemeClr>
+        </a:solidFill>
+        <a:ln>
+          <a:noFill/>
+        </a:ln>
+        <a:effectLst/>
+        <a:scene3d>
+          <a:camera prst="orthographicFront"/>
+          <a:lightRig rig="threePt" dir="t">
+            <a:rot lat="0" lon="0" rev="7500000"/>
+          </a:lightRig>
+        </a:scene3d>
+        <a:sp3d prstMaterial="plastic">
+          <a:bevelT w="127000" h="25400" prst="relaxedInset"/>
+        </a:sp3d>
+      </dsp:spPr>
+      <dsp:style>
+        <a:lnRef idx="0">
+          <a:scrgbClr r="0" g="0" b="0"/>
+        </a:lnRef>
+        <a:fillRef idx="3">
+          <a:scrgbClr r="0" g="0" b="0"/>
+        </a:fillRef>
+        <a:effectRef idx="2">
+          <a:scrgbClr r="0" g="0" b="0"/>
+        </a:effectRef>
+        <a:fontRef idx="minor">
+          <a:schemeClr val="lt1"/>
+        </a:fontRef>
+      </dsp:style>
+    </dsp:sp>
+    <dsp:sp modelId="{F5E56393-E667-4366-B7B7-3C0C77BCB08E}">
+      <dsp:nvSpPr>
+        <dsp:cNvPr id="0" name=""/>
+        <dsp:cNvSpPr/>
+      </dsp:nvSpPr>
+      <dsp:spPr>
+        <a:xfrm>
+          <a:off x="2071299" y="823112"/>
+          <a:ext cx="171997" cy="171997"/>
+        </a:xfrm>
+        <a:prstGeom prst="ellipse">
+          <a:avLst/>
+        </a:prstGeom>
+        <a:solidFill>
+          <a:schemeClr val="accent2">
+            <a:hueOff val="0"/>
+            <a:satOff val="0"/>
+            <a:lumOff val="0"/>
+            <a:alphaOff val="0"/>
+          </a:schemeClr>
+        </a:solidFill>
+        <a:ln>
+          <a:noFill/>
+        </a:ln>
+        <a:effectLst/>
+        <a:scene3d>
+          <a:camera prst="orthographicFront"/>
+          <a:lightRig rig="threePt" dir="t">
+            <a:rot lat="0" lon="0" rev="7500000"/>
+          </a:lightRig>
+        </a:scene3d>
+        <a:sp3d prstMaterial="plastic">
+          <a:bevelT w="127000" h="25400" prst="relaxedInset"/>
+        </a:sp3d>
+      </dsp:spPr>
+      <dsp:style>
+        <a:lnRef idx="0">
+          <a:scrgbClr r="0" g="0" b="0"/>
+        </a:lnRef>
+        <a:fillRef idx="3">
+          <a:scrgbClr r="0" g="0" b="0"/>
+        </a:fillRef>
+        <a:effectRef idx="2">
+          <a:scrgbClr r="0" g="0" b="0"/>
+        </a:effectRef>
+        <a:fontRef idx="minor">
+          <a:schemeClr val="lt1"/>
+        </a:fontRef>
+      </dsp:style>
+    </dsp:sp>
+    <dsp:sp modelId="{9EB17CD6-4477-406E-B5B4-6E43121853F8}">
+      <dsp:nvSpPr>
+        <dsp:cNvPr id="0" name=""/>
+        <dsp:cNvSpPr/>
+      </dsp:nvSpPr>
+      <dsp:spPr>
+        <a:xfrm>
+          <a:off x="2215777" y="1087989"/>
+          <a:ext cx="171997" cy="171997"/>
+        </a:xfrm>
+        <a:prstGeom prst="ellipse">
+          <a:avLst/>
+        </a:prstGeom>
+        <a:solidFill>
+          <a:schemeClr val="accent2">
+            <a:hueOff val="0"/>
+            <a:satOff val="0"/>
+            <a:lumOff val="0"/>
+            <a:alphaOff val="0"/>
+          </a:schemeClr>
+        </a:solidFill>
+        <a:ln>
+          <a:noFill/>
+        </a:ln>
+        <a:effectLst/>
+        <a:scene3d>
+          <a:camera prst="orthographicFront"/>
+          <a:lightRig rig="threePt" dir="t">
+            <a:rot lat="0" lon="0" rev="7500000"/>
+          </a:lightRig>
+        </a:scene3d>
+        <a:sp3d prstMaterial="plastic">
+          <a:bevelT w="127000" h="25400" prst="relaxedInset"/>
+        </a:sp3d>
+      </dsp:spPr>
+      <dsp:style>
+        <a:lnRef idx="0">
+          <a:scrgbClr r="0" g="0" b="0"/>
+        </a:lnRef>
+        <a:fillRef idx="3">
+          <a:scrgbClr r="0" g="0" b="0"/>
+        </a:fillRef>
+        <a:effectRef idx="2">
+          <a:scrgbClr r="0" g="0" b="0"/>
+        </a:effectRef>
+        <a:fontRef idx="minor">
+          <a:schemeClr val="lt1"/>
+        </a:fontRef>
+      </dsp:style>
+    </dsp:sp>
+    <dsp:sp modelId="{A99A92A7-8786-4861-9175-D6E5E570B5EE}">
+      <dsp:nvSpPr>
+        <dsp:cNvPr id="0" name=""/>
+        <dsp:cNvSpPr/>
+      </dsp:nvSpPr>
+      <dsp:spPr>
+        <a:xfrm>
+          <a:off x="963633" y="582315"/>
+          <a:ext cx="442279" cy="442279"/>
+        </a:xfrm>
+        <a:prstGeom prst="ellipse">
+          <a:avLst/>
+        </a:prstGeom>
+        <a:solidFill>
+          <a:schemeClr val="accent2">
+            <a:hueOff val="0"/>
+            <a:satOff val="0"/>
+            <a:lumOff val="0"/>
+            <a:alphaOff val="0"/>
+          </a:schemeClr>
+        </a:solidFill>
+        <a:ln>
+          <a:noFill/>
+        </a:ln>
+        <a:effectLst/>
+        <a:scene3d>
+          <a:camera prst="orthographicFront"/>
+          <a:lightRig rig="threePt" dir="t">
+            <a:rot lat="0" lon="0" rev="7500000"/>
+          </a:lightRig>
+        </a:scene3d>
+        <a:sp3d prstMaterial="plastic">
+          <a:bevelT w="127000" h="25400" prst="relaxedInset"/>
+        </a:sp3d>
+      </dsp:spPr>
+      <dsp:style>
+        <a:lnRef idx="0">
+          <a:scrgbClr r="0" g="0" b="0"/>
+        </a:lnRef>
+        <a:fillRef idx="3">
+          <a:scrgbClr r="0" g="0" b="0"/>
+        </a:fillRef>
+        <a:effectRef idx="2">
+          <a:scrgbClr r="0" g="0" b="0"/>
+        </a:effectRef>
+        <a:fontRef idx="minor">
+          <a:schemeClr val="lt1"/>
+        </a:fontRef>
+      </dsp:style>
+    </dsp:sp>
+    <dsp:sp modelId="{F67F52B3-912F-41A1-9FC5-B4895EE09DB7}">
+      <dsp:nvSpPr>
+        <dsp:cNvPr id="0" name=""/>
+        <dsp:cNvSpPr/>
+      </dsp:nvSpPr>
+      <dsp:spPr>
+        <a:xfrm>
+          <a:off x="24525" y="1497343"/>
+          <a:ext cx="171997" cy="171997"/>
+        </a:xfrm>
+        <a:prstGeom prst="ellipse">
+          <a:avLst/>
+        </a:prstGeom>
+        <a:solidFill>
+          <a:schemeClr val="accent2">
+            <a:hueOff val="0"/>
+            <a:satOff val="0"/>
+            <a:lumOff val="0"/>
+            <a:alphaOff val="0"/>
+          </a:schemeClr>
+        </a:solidFill>
+        <a:ln>
+          <a:noFill/>
+        </a:ln>
+        <a:effectLst/>
+        <a:scene3d>
+          <a:camera prst="orthographicFront"/>
+          <a:lightRig rig="threePt" dir="t">
+            <a:rot lat="0" lon="0" rev="7500000"/>
+          </a:lightRig>
+        </a:scene3d>
+        <a:sp3d prstMaterial="plastic">
+          <a:bevelT w="127000" h="25400" prst="relaxedInset"/>
+        </a:sp3d>
+      </dsp:spPr>
+      <dsp:style>
+        <a:lnRef idx="0">
+          <a:scrgbClr r="0" g="0" b="0"/>
+        </a:lnRef>
+        <a:fillRef idx="3">
+          <a:scrgbClr r="0" g="0" b="0"/>
+        </a:fillRef>
+        <a:effectRef idx="2">
+          <a:scrgbClr r="0" g="0" b="0"/>
+        </a:effectRef>
+        <a:fontRef idx="minor">
+          <a:schemeClr val="lt1"/>
+        </a:fontRef>
+      </dsp:style>
+    </dsp:sp>
+    <dsp:sp modelId="{D7B8E378-3FD2-4DCE-9938-B169FA5F5A94}">
+      <dsp:nvSpPr>
+        <dsp:cNvPr id="0" name=""/>
+        <dsp:cNvSpPr/>
+      </dsp:nvSpPr>
+      <dsp:spPr>
+        <a:xfrm>
+          <a:off x="169003" y="1714061"/>
+          <a:ext cx="270282" cy="270282"/>
+        </a:xfrm>
+        <a:prstGeom prst="ellipse">
+          <a:avLst/>
+        </a:prstGeom>
+        <a:solidFill>
+          <a:schemeClr val="accent2">
+            <a:hueOff val="0"/>
+            <a:satOff val="0"/>
+            <a:lumOff val="0"/>
+            <a:alphaOff val="0"/>
+          </a:schemeClr>
+        </a:solidFill>
+        <a:ln>
+          <a:noFill/>
+        </a:ln>
+        <a:effectLst/>
+        <a:scene3d>
+          <a:camera prst="orthographicFront"/>
+          <a:lightRig rig="threePt" dir="t">
+            <a:rot lat="0" lon="0" rev="7500000"/>
+          </a:lightRig>
+        </a:scene3d>
+        <a:sp3d prstMaterial="plastic">
+          <a:bevelT w="127000" h="25400" prst="relaxedInset"/>
+        </a:sp3d>
+      </dsp:spPr>
+      <dsp:style>
+        <a:lnRef idx="0">
+          <a:scrgbClr r="0" g="0" b="0"/>
+        </a:lnRef>
+        <a:fillRef idx="3">
+          <a:scrgbClr r="0" g="0" b="0"/>
+        </a:fillRef>
+        <a:effectRef idx="2">
+          <a:scrgbClr r="0" g="0" b="0"/>
+        </a:effectRef>
+        <a:fontRef idx="minor">
+          <a:schemeClr val="lt1"/>
+        </a:fontRef>
+      </dsp:style>
+    </dsp:sp>
+    <dsp:sp modelId="{5E93CBC1-8319-4A44-82A9-15DC1B7668D8}">
+      <dsp:nvSpPr>
+        <dsp:cNvPr id="0" name=""/>
+        <dsp:cNvSpPr/>
+      </dsp:nvSpPr>
+      <dsp:spPr>
+        <a:xfrm>
+          <a:off x="530199" y="1906698"/>
+          <a:ext cx="393137" cy="393137"/>
+        </a:xfrm>
+        <a:prstGeom prst="ellipse">
+          <a:avLst/>
+        </a:prstGeom>
+        <a:solidFill>
+          <a:schemeClr val="accent2">
+            <a:hueOff val="0"/>
+            <a:satOff val="0"/>
+            <a:lumOff val="0"/>
+            <a:alphaOff val="0"/>
+          </a:schemeClr>
+        </a:solidFill>
+        <a:ln>
+          <a:noFill/>
+        </a:ln>
+        <a:effectLst/>
+        <a:scene3d>
+          <a:camera prst="orthographicFront"/>
+          <a:lightRig rig="threePt" dir="t">
+            <a:rot lat="0" lon="0" rev="7500000"/>
+          </a:lightRig>
+        </a:scene3d>
+        <a:sp3d prstMaterial="plastic">
+          <a:bevelT w="127000" h="25400" prst="relaxedInset"/>
+        </a:sp3d>
+      </dsp:spPr>
+      <dsp:style>
+        <a:lnRef idx="0">
+          <a:scrgbClr r="0" g="0" b="0"/>
+        </a:lnRef>
+        <a:fillRef idx="3">
+          <a:scrgbClr r="0" g="0" b="0"/>
+        </a:fillRef>
+        <a:effectRef idx="2">
+          <a:scrgbClr r="0" g="0" b="0"/>
+        </a:effectRef>
+        <a:fontRef idx="minor">
+          <a:schemeClr val="lt1"/>
+        </a:fontRef>
+      </dsp:style>
+    </dsp:sp>
+    <dsp:sp modelId="{05AF71BA-FD56-4DC4-81D6-8513D8A16176}">
+      <dsp:nvSpPr>
+        <dsp:cNvPr id="0" name=""/>
+        <dsp:cNvSpPr/>
+      </dsp:nvSpPr>
+      <dsp:spPr>
+        <a:xfrm>
+          <a:off x="1035872" y="2219734"/>
+          <a:ext cx="171997" cy="171997"/>
+        </a:xfrm>
+        <a:prstGeom prst="ellipse">
+          <a:avLst/>
+        </a:prstGeom>
+        <a:solidFill>
+          <a:schemeClr val="accent2">
+            <a:hueOff val="0"/>
+            <a:satOff val="0"/>
+            <a:lumOff val="0"/>
+            <a:alphaOff val="0"/>
+          </a:schemeClr>
+        </a:solidFill>
+        <a:ln>
+          <a:noFill/>
+        </a:ln>
+        <a:effectLst/>
+        <a:scene3d>
+          <a:camera prst="orthographicFront"/>
+          <a:lightRig rig="threePt" dir="t">
+            <a:rot lat="0" lon="0" rev="7500000"/>
+          </a:lightRig>
+        </a:scene3d>
+        <a:sp3d prstMaterial="plastic">
+          <a:bevelT w="127000" h="25400" prst="relaxedInset"/>
+        </a:sp3d>
+      </dsp:spPr>
+      <dsp:style>
+        <a:lnRef idx="0">
+          <a:scrgbClr r="0" g="0" b="0"/>
+        </a:lnRef>
+        <a:fillRef idx="3">
+          <a:scrgbClr r="0" g="0" b="0"/>
+        </a:fillRef>
+        <a:effectRef idx="2">
+          <a:scrgbClr r="0" g="0" b="0"/>
+        </a:effectRef>
+        <a:fontRef idx="minor">
+          <a:schemeClr val="lt1"/>
+        </a:fontRef>
+      </dsp:style>
+    </dsp:sp>
+    <dsp:sp modelId="{6DF58139-AC4A-4B7C-87C9-F08EE08C4399}">
+      <dsp:nvSpPr>
+        <dsp:cNvPr id="0" name=""/>
+        <dsp:cNvSpPr/>
+      </dsp:nvSpPr>
+      <dsp:spPr>
+        <a:xfrm>
+          <a:off x="1132191" y="1906698"/>
+          <a:ext cx="270282" cy="270282"/>
+        </a:xfrm>
+        <a:prstGeom prst="ellipse">
+          <a:avLst/>
+        </a:prstGeom>
+        <a:solidFill>
+          <a:schemeClr val="accent2">
+            <a:hueOff val="0"/>
+            <a:satOff val="0"/>
+            <a:lumOff val="0"/>
+            <a:alphaOff val="0"/>
+          </a:schemeClr>
+        </a:solidFill>
+        <a:ln>
+          <a:noFill/>
+        </a:ln>
+        <a:effectLst/>
+        <a:scene3d>
+          <a:camera prst="orthographicFront"/>
+          <a:lightRig rig="threePt" dir="t">
+            <a:rot lat="0" lon="0" rev="7500000"/>
+          </a:lightRig>
+        </a:scene3d>
+        <a:sp3d prstMaterial="plastic">
+          <a:bevelT w="127000" h="25400" prst="relaxedInset"/>
+        </a:sp3d>
+      </dsp:spPr>
+      <dsp:style>
+        <a:lnRef idx="0">
+          <a:scrgbClr r="0" g="0" b="0"/>
+        </a:lnRef>
+        <a:fillRef idx="3">
+          <a:scrgbClr r="0" g="0" b="0"/>
+        </a:fillRef>
+        <a:effectRef idx="2">
+          <a:scrgbClr r="0" g="0" b="0"/>
+        </a:effectRef>
+        <a:fontRef idx="minor">
+          <a:schemeClr val="lt1"/>
+        </a:fontRef>
+      </dsp:style>
+    </dsp:sp>
+    <dsp:sp modelId="{A9444372-B5FE-45F2-AC76-6F2B695F6772}">
+      <dsp:nvSpPr>
+        <dsp:cNvPr id="0" name=""/>
+        <dsp:cNvSpPr/>
+      </dsp:nvSpPr>
+      <dsp:spPr>
+        <a:xfrm>
+          <a:off x="1372988" y="2243814"/>
+          <a:ext cx="171997" cy="171997"/>
+        </a:xfrm>
+        <a:prstGeom prst="ellipse">
+          <a:avLst/>
+        </a:prstGeom>
+        <a:solidFill>
+          <a:schemeClr val="accent2">
+            <a:hueOff val="0"/>
+            <a:satOff val="0"/>
+            <a:lumOff val="0"/>
+            <a:alphaOff val="0"/>
+          </a:schemeClr>
+        </a:solidFill>
+        <a:ln>
+          <a:noFill/>
+        </a:ln>
+        <a:effectLst/>
+        <a:scene3d>
+          <a:camera prst="orthographicFront"/>
+          <a:lightRig rig="threePt" dir="t">
+            <a:rot lat="0" lon="0" rev="7500000"/>
+          </a:lightRig>
+        </a:scene3d>
+        <a:sp3d prstMaterial="plastic">
+          <a:bevelT w="127000" h="25400" prst="relaxedInset"/>
+        </a:sp3d>
+      </dsp:spPr>
+      <dsp:style>
+        <a:lnRef idx="0">
+          <a:scrgbClr r="0" g="0" b="0"/>
+        </a:lnRef>
+        <a:fillRef idx="3">
+          <a:scrgbClr r="0" g="0" b="0"/>
+        </a:fillRef>
+        <a:effectRef idx="2">
+          <a:scrgbClr r="0" g="0" b="0"/>
+        </a:effectRef>
+        <a:fontRef idx="minor">
+          <a:schemeClr val="lt1"/>
+        </a:fontRef>
+      </dsp:style>
+    </dsp:sp>
+    <dsp:sp modelId="{9100C608-1DC6-42E8-A342-34ADD4F24557}">
+      <dsp:nvSpPr>
+        <dsp:cNvPr id="0" name=""/>
+        <dsp:cNvSpPr/>
+      </dsp:nvSpPr>
+      <dsp:spPr>
+        <a:xfrm>
+          <a:off x="1589705" y="1858539"/>
+          <a:ext cx="393137" cy="393137"/>
+        </a:xfrm>
+        <a:prstGeom prst="ellipse">
+          <a:avLst/>
+        </a:prstGeom>
+        <a:solidFill>
+          <a:schemeClr val="accent2">
+            <a:hueOff val="0"/>
+            <a:satOff val="0"/>
+            <a:lumOff val="0"/>
+            <a:alphaOff val="0"/>
+          </a:schemeClr>
+        </a:solidFill>
+        <a:ln>
+          <a:noFill/>
+        </a:ln>
+        <a:effectLst/>
+        <a:scene3d>
+          <a:camera prst="orthographicFront"/>
+          <a:lightRig rig="threePt" dir="t">
+            <a:rot lat="0" lon="0" rev="7500000"/>
+          </a:lightRig>
+        </a:scene3d>
+        <a:sp3d prstMaterial="plastic">
+          <a:bevelT w="127000" h="25400" prst="relaxedInset"/>
+        </a:sp3d>
+      </dsp:spPr>
+      <dsp:style>
+        <a:lnRef idx="0">
+          <a:scrgbClr r="0" g="0" b="0"/>
+        </a:lnRef>
+        <a:fillRef idx="3">
+          <a:scrgbClr r="0" g="0" b="0"/>
+        </a:fillRef>
+        <a:effectRef idx="2">
+          <a:scrgbClr r="0" g="0" b="0"/>
+        </a:effectRef>
+        <a:fontRef idx="minor">
+          <a:schemeClr val="lt1"/>
+        </a:fontRef>
+      </dsp:style>
+    </dsp:sp>
+    <dsp:sp modelId="{C9BE3636-61F4-4C2F-9155-A2454FBE951D}">
+      <dsp:nvSpPr>
+        <dsp:cNvPr id="0" name=""/>
+        <dsp:cNvSpPr/>
+      </dsp:nvSpPr>
+      <dsp:spPr>
+        <a:xfrm>
+          <a:off x="2119458" y="1762220"/>
+          <a:ext cx="270282" cy="270282"/>
+        </a:xfrm>
+        <a:prstGeom prst="ellipse">
+          <a:avLst/>
+        </a:prstGeom>
+        <a:solidFill>
+          <a:schemeClr val="accent2">
+            <a:hueOff val="0"/>
+            <a:satOff val="0"/>
+            <a:lumOff val="0"/>
+            <a:alphaOff val="0"/>
+          </a:schemeClr>
+        </a:solidFill>
+        <a:ln>
+          <a:noFill/>
+        </a:ln>
+        <a:effectLst/>
+        <a:scene3d>
+          <a:camera prst="orthographicFront"/>
+          <a:lightRig rig="threePt" dir="t">
+            <a:rot lat="0" lon="0" rev="7500000"/>
+          </a:lightRig>
+        </a:scene3d>
+        <a:sp3d prstMaterial="plastic">
+          <a:bevelT w="127000" h="25400" prst="relaxedInset"/>
+        </a:sp3d>
+      </dsp:spPr>
+      <dsp:style>
+        <a:lnRef idx="0">
+          <a:scrgbClr r="0" g="0" b="0"/>
+        </a:lnRef>
+        <a:fillRef idx="3">
+          <a:scrgbClr r="0" g="0" b="0"/>
+        </a:fillRef>
+        <a:effectRef idx="2">
+          <a:scrgbClr r="0" g="0" b="0"/>
+        </a:effectRef>
+        <a:fontRef idx="minor">
+          <a:schemeClr val="lt1"/>
+        </a:fontRef>
+      </dsp:style>
+    </dsp:sp>
+    <dsp:sp modelId="{BC96A45A-3149-42EA-9422-AF4275D3277D}">
+      <dsp:nvSpPr>
+        <dsp:cNvPr id="0" name=""/>
+        <dsp:cNvSpPr/>
+      </dsp:nvSpPr>
+      <dsp:spPr>
+        <a:xfrm>
+          <a:off x="2389740" y="630074"/>
+          <a:ext cx="793780" cy="1515413"/>
+        </a:xfrm>
+        <a:prstGeom prst="chevron">
+          <a:avLst>
+            <a:gd name="adj" fmla="val 62310"/>
+          </a:avLst>
+        </a:prstGeom>
+        <a:solidFill>
+          <a:schemeClr val="accent3"/>
+        </a:solidFill>
+        <a:ln>
+          <a:noFill/>
+        </a:ln>
+        <a:effectLst/>
+        <a:scene3d>
+          <a:camera prst="orthographicFront"/>
+          <a:lightRig rig="threePt" dir="t">
+            <a:rot lat="0" lon="0" rev="7500000"/>
+          </a:lightRig>
+        </a:scene3d>
+        <a:sp3d z="-70000" extrusionH="63500" prstMaterial="matte">
+          <a:bevelT w="25400" h="6350" prst="relaxedInset"/>
+          <a:contourClr>
+            <a:schemeClr val="bg1"/>
+          </a:contourClr>
+        </a:sp3d>
+      </dsp:spPr>
+      <dsp:style>
+        <a:lnRef idx="0">
+          <a:scrgbClr r="0" g="0" b="0"/>
+        </a:lnRef>
+        <a:fillRef idx="1">
+          <a:scrgbClr r="0" g="0" b="0"/>
+        </a:fillRef>
+        <a:effectRef idx="2">
+          <a:scrgbClr r="0" g="0" b="0"/>
+        </a:effectRef>
+        <a:fontRef idx="minor">
+          <a:schemeClr val="lt1"/>
+        </a:fontRef>
+      </dsp:style>
+    </dsp:sp>
+    <dsp:sp modelId="{9D3A3B6C-6E2B-4CE4-AB26-5A5B3DBDF995}">
+      <dsp:nvSpPr>
+        <dsp:cNvPr id="0" name=""/>
+        <dsp:cNvSpPr/>
+      </dsp:nvSpPr>
+      <dsp:spPr>
+        <a:xfrm>
+          <a:off x="3183520" y="630810"/>
+          <a:ext cx="2164855" cy="1515398"/>
+        </a:xfrm>
+        <a:prstGeom prst="rect">
+          <a:avLst/>
+        </a:prstGeom>
+        <a:noFill/>
+        <a:ln>
+          <a:noFill/>
+        </a:ln>
+        <a:effectLst/>
+      </dsp:spPr>
+      <dsp:style>
+        <a:lnRef idx="0">
+          <a:scrgbClr r="0" g="0" b="0"/>
+        </a:lnRef>
+        <a:fillRef idx="0">
+          <a:scrgbClr r="0" g="0" b="0"/>
+        </a:fillRef>
+        <a:effectRef idx="0">
+          <a:scrgbClr r="0" g="0" b="0"/>
+        </a:effectRef>
+        <a:fontRef idx="minor"/>
+      </dsp:style>
+      <dsp:txBody>
+        <a:bodyPr spcFirstLastPara="0" vert="horz" wrap="square" lIns="45720" tIns="45720" rIns="45720" bIns="45720" numCol="1" spcCol="1270" anchor="ctr" anchorCtr="0">
+          <a:noAutofit/>
+        </a:bodyPr>
+        <a:lstStyle/>
+        <a:p>
+          <a:pPr lvl="0" algn="ctr" defTabSz="1600200">
+            <a:lnSpc>
+              <a:spcPct val="90000"/>
+            </a:lnSpc>
+            <a:spcBef>
+              <a:spcPct val="0"/>
+            </a:spcBef>
+            <a:spcAft>
+              <a:spcPct val="35000"/>
+            </a:spcAft>
+          </a:pPr>
+          <a:r>
+            <a:rPr lang="en-US" sz="3600" kern="1200" dirty="0" smtClean="0">
+              <a:solidFill>
+                <a:schemeClr val="tx2"/>
+              </a:solidFill>
+            </a:rPr>
+            <a:t>is an</a:t>
+          </a:r>
+          <a:endParaRPr lang="en-US" sz="3600" kern="1200" dirty="0">
+            <a:solidFill>
+              <a:schemeClr val="tx2"/>
+            </a:solidFill>
+          </a:endParaRPr>
+        </a:p>
+      </dsp:txBody>
+      <dsp:txXfrm>
+        <a:off x="3183520" y="630810"/>
+        <a:ext cx="2164855" cy="1515398"/>
+      </dsp:txXfrm>
+    </dsp:sp>
+    <dsp:sp modelId="{88944793-F90B-4500-8128-B6D26CB5FEAF}">
+      <dsp:nvSpPr>
+        <dsp:cNvPr id="0" name=""/>
+        <dsp:cNvSpPr/>
+      </dsp:nvSpPr>
+      <dsp:spPr>
+        <a:xfrm>
+          <a:off x="5348376" y="630074"/>
+          <a:ext cx="793780" cy="1515413"/>
+        </a:xfrm>
+        <a:prstGeom prst="chevron">
+          <a:avLst>
+            <a:gd name="adj" fmla="val 62310"/>
+          </a:avLst>
+        </a:prstGeom>
+        <a:solidFill>
+          <a:schemeClr val="accent3"/>
+        </a:solidFill>
+        <a:ln>
+          <a:noFill/>
+        </a:ln>
+        <a:effectLst/>
+        <a:scene3d>
+          <a:camera prst="orthographicFront"/>
+          <a:lightRig rig="threePt" dir="t">
+            <a:rot lat="0" lon="0" rev="7500000"/>
+          </a:lightRig>
+        </a:scene3d>
+        <a:sp3d z="-70000" extrusionH="63500" prstMaterial="matte">
+          <a:bevelT w="25400" h="6350" prst="relaxedInset"/>
+          <a:contourClr>
+            <a:schemeClr val="bg1"/>
+          </a:contourClr>
+        </a:sp3d>
+      </dsp:spPr>
+      <dsp:style>
+        <a:lnRef idx="0">
+          <a:scrgbClr r="0" g="0" b="0"/>
+        </a:lnRef>
+        <a:fillRef idx="1">
+          <a:scrgbClr r="0" g="0" b="0"/>
+        </a:fillRef>
+        <a:effectRef idx="2">
+          <a:scrgbClr r="0" g="0" b="0"/>
+        </a:effectRef>
+        <a:fontRef idx="minor">
+          <a:schemeClr val="lt1"/>
+        </a:fontRef>
+      </dsp:style>
+    </dsp:sp>
+    <dsp:sp modelId="{226B20CA-2DC3-4A39-8225-FD351D637B04}">
+      <dsp:nvSpPr>
+        <dsp:cNvPr id="0" name=""/>
+        <dsp:cNvSpPr/>
+      </dsp:nvSpPr>
+      <dsp:spPr>
+        <a:xfrm>
+          <a:off x="6228750" y="504837"/>
+          <a:ext cx="1840127" cy="1840127"/>
+        </a:xfrm>
+        <a:prstGeom prst="ellipse">
+          <a:avLst/>
+        </a:prstGeom>
+        <a:solidFill>
+          <a:schemeClr val="accent2">
+            <a:hueOff val="0"/>
+            <a:satOff val="0"/>
+            <a:lumOff val="0"/>
+            <a:alphaOff val="0"/>
+          </a:schemeClr>
+        </a:solidFill>
+        <a:ln>
+          <a:noFill/>
+        </a:ln>
+        <a:effectLst/>
+        <a:scene3d>
+          <a:camera prst="orthographicFront"/>
+          <a:lightRig rig="threePt" dir="t">
+            <a:rot lat="0" lon="0" rev="7500000"/>
+          </a:lightRig>
+        </a:scene3d>
+        <a:sp3d prstMaterial="plastic">
+          <a:bevelT w="127000" h="25400" prst="relaxedInset"/>
+        </a:sp3d>
+      </dsp:spPr>
+      <dsp:style>
+        <a:lnRef idx="0">
+          <a:scrgbClr r="0" g="0" b="0"/>
+        </a:lnRef>
+        <a:fillRef idx="3">
+          <a:scrgbClr r="0" g="0" b="0"/>
+        </a:fillRef>
+        <a:effectRef idx="2">
+          <a:scrgbClr r="0" g="0" b="0"/>
+        </a:effectRef>
+        <a:fontRef idx="minor">
+          <a:schemeClr val="lt1"/>
+        </a:fontRef>
+      </dsp:style>
+      <dsp:txBody>
+        <a:bodyPr spcFirstLastPara="0" vert="horz" wrap="square" lIns="0" tIns="0" rIns="0" bIns="0" numCol="1" spcCol="1270" anchor="ctr" anchorCtr="0">
+          <a:noAutofit/>
+        </a:bodyPr>
+        <a:lstStyle/>
+        <a:p>
+          <a:pPr lvl="0" algn="ctr" defTabSz="1600200">
+            <a:lnSpc>
+              <a:spcPct val="90000"/>
+            </a:lnSpc>
+            <a:spcBef>
+              <a:spcPct val="0"/>
+            </a:spcBef>
+            <a:spcAft>
+              <a:spcPct val="35000"/>
+            </a:spcAft>
+          </a:pPr>
+          <a:r>
+            <a:rPr lang="en-US" sz="3600" kern="1200" dirty="0" smtClean="0">
+              <a:solidFill>
+                <a:schemeClr val="tx2"/>
+              </a:solidFill>
+            </a:rPr>
+            <a:t>Actor</a:t>
+          </a:r>
+          <a:endParaRPr lang="en-US" sz="3600" kern="1200" dirty="0">
+            <a:solidFill>
+              <a:schemeClr val="tx2"/>
+            </a:solidFill>
+          </a:endParaRPr>
+        </a:p>
+      </dsp:txBody>
+      <dsp:txXfrm>
+        <a:off x="6498230" y="774317"/>
+        <a:ext cx="1301167" cy="1301167"/>
+      </dsp:txXfrm>
+    </dsp:sp>
   </dsp:spTree>
 </dsp:drawing>
 </file>
@@ -7398,6 +9182,423 @@
       <dsp:cNvGrpSpPr/>
     </dsp:nvGrpSpPr>
     <dsp:grpSpPr/>
+    <dsp:sp modelId="{2E37B686-9C7B-4080-8C57-285D0941DC9D}">
+      <dsp:nvSpPr>
+        <dsp:cNvPr id="0" name=""/>
+        <dsp:cNvSpPr/>
+      </dsp:nvSpPr>
+      <dsp:spPr>
+        <a:xfrm>
+          <a:off x="-5789305" y="-886259"/>
+          <a:ext cx="6893793" cy="6893793"/>
+        </a:xfrm>
+        <a:prstGeom prst="blockArc">
+          <a:avLst>
+            <a:gd name="adj1" fmla="val 18900000"/>
+            <a:gd name="adj2" fmla="val 2700000"/>
+            <a:gd name="adj3" fmla="val 313"/>
+          </a:avLst>
+        </a:prstGeom>
+        <a:noFill/>
+        <a:ln w="28575" cap="flat" cmpd="sng" algn="ctr">
+          <a:solidFill>
+            <a:srgbClr val="FE7E00"/>
+          </a:solidFill>
+          <a:prstDash val="solid"/>
+        </a:ln>
+        <a:effectLst/>
+      </dsp:spPr>
+      <dsp:style>
+        <a:lnRef idx="2">
+          <a:scrgbClr r="0" g="0" b="0"/>
+        </a:lnRef>
+        <a:fillRef idx="0">
+          <a:scrgbClr r="0" g="0" b="0"/>
+        </a:fillRef>
+        <a:effectRef idx="0">
+          <a:scrgbClr r="0" g="0" b="0"/>
+        </a:effectRef>
+        <a:fontRef idx="minor"/>
+      </dsp:style>
+    </dsp:sp>
+    <dsp:sp modelId="{BB589093-F445-431E-8BFE-89A2D03A438F}">
+      <dsp:nvSpPr>
+        <dsp:cNvPr id="0" name=""/>
+        <dsp:cNvSpPr/>
+      </dsp:nvSpPr>
+      <dsp:spPr>
+        <a:xfrm>
+          <a:off x="710832" y="512127"/>
+          <a:ext cx="6533693" cy="1024255"/>
+        </a:xfrm>
+        <a:prstGeom prst="rect">
+          <a:avLst/>
+        </a:prstGeom>
+        <a:noFill/>
+        <a:ln w="28575" cap="flat" cmpd="sng" algn="ctr">
+          <a:solidFill>
+            <a:srgbClr val="FE7E00"/>
+          </a:solidFill>
+          <a:prstDash val="solid"/>
+        </a:ln>
+        <a:effectLst/>
+      </dsp:spPr>
+      <dsp:style>
+        <a:lnRef idx="2">
+          <a:scrgbClr r="0" g="0" b="0"/>
+        </a:lnRef>
+        <a:fillRef idx="1">
+          <a:scrgbClr r="0" g="0" b="0"/>
+        </a:fillRef>
+        <a:effectRef idx="0">
+          <a:scrgbClr r="0" g="0" b="0"/>
+        </a:effectRef>
+        <a:fontRef idx="minor">
+          <a:schemeClr val="lt1"/>
+        </a:fontRef>
+      </dsp:style>
+      <dsp:txBody>
+        <a:bodyPr spcFirstLastPara="0" vert="horz" wrap="square" lIns="813002" tIns="78740" rIns="78740" bIns="78740" numCol="1" spcCol="1270" anchor="ctr" anchorCtr="0">
+          <a:noAutofit/>
+        </a:bodyPr>
+        <a:lstStyle/>
+        <a:p>
+          <a:pPr lvl="0" algn="l" defTabSz="1377950">
+            <a:lnSpc>
+              <a:spcPct val="90000"/>
+            </a:lnSpc>
+            <a:spcBef>
+              <a:spcPct val="0"/>
+            </a:spcBef>
+            <a:spcAft>
+              <a:spcPct val="35000"/>
+            </a:spcAft>
+          </a:pPr>
+          <a:r>
+            <a:rPr lang="en-US" sz="3100" b="1" kern="1200" dirty="0" smtClean="0">
+              <a:solidFill>
+                <a:srgbClr val="FFF271"/>
+              </a:solidFill>
+            </a:rPr>
+            <a:t>Determine</a:t>
+          </a:r>
+          <a:r>
+            <a:rPr lang="en-US" sz="3100" kern="1200" dirty="0" smtClean="0">
+              <a:solidFill>
+                <a:srgbClr val="FFF271"/>
+              </a:solidFill>
+            </a:rPr>
+            <a:t> </a:t>
+          </a:r>
+          <a:r>
+            <a:rPr lang="en-US" sz="3100" kern="1200" dirty="0" smtClean="0">
+              <a:solidFill>
+                <a:schemeClr val="tx2"/>
+              </a:solidFill>
+            </a:rPr>
+            <a:t>what to do with the next incoming message</a:t>
+          </a:r>
+          <a:endParaRPr lang="en-US" sz="3100" kern="1200" dirty="0">
+            <a:solidFill>
+              <a:schemeClr val="tx2"/>
+            </a:solidFill>
+          </a:endParaRPr>
+        </a:p>
+      </dsp:txBody>
+      <dsp:txXfrm>
+        <a:off x="710832" y="512127"/>
+        <a:ext cx="6533693" cy="1024255"/>
+      </dsp:txXfrm>
+    </dsp:sp>
+    <dsp:sp modelId="{99623AEA-F7B7-424D-8899-FCDF05F89745}">
+      <dsp:nvSpPr>
+        <dsp:cNvPr id="0" name=""/>
+        <dsp:cNvSpPr/>
+      </dsp:nvSpPr>
+      <dsp:spPr>
+        <a:xfrm>
+          <a:off x="70673" y="384095"/>
+          <a:ext cx="1280318" cy="1280318"/>
+        </a:xfrm>
+        <a:prstGeom prst="ellipse">
+          <a:avLst/>
+        </a:prstGeom>
+        <a:solidFill>
+          <a:schemeClr val="tx1"/>
+        </a:solidFill>
+        <a:ln w="57150" cap="flat" cmpd="sng" algn="ctr">
+          <a:solidFill>
+            <a:srgbClr val="FE7E00"/>
+          </a:solidFill>
+          <a:prstDash val="solid"/>
+        </a:ln>
+        <a:effectLst/>
+      </dsp:spPr>
+      <dsp:style>
+        <a:lnRef idx="2">
+          <a:scrgbClr r="0" g="0" b="0"/>
+        </a:lnRef>
+        <a:fillRef idx="1">
+          <a:scrgbClr r="0" g="0" b="0"/>
+        </a:fillRef>
+        <a:effectRef idx="0">
+          <a:scrgbClr r="0" g="0" b="0"/>
+        </a:effectRef>
+        <a:fontRef idx="minor"/>
+      </dsp:style>
+    </dsp:sp>
+    <dsp:sp modelId="{D221716B-6F75-4B94-AC5A-5DF502B9BCFC}">
+      <dsp:nvSpPr>
+        <dsp:cNvPr id="0" name=""/>
+        <dsp:cNvSpPr/>
+      </dsp:nvSpPr>
+      <dsp:spPr>
+        <a:xfrm>
+          <a:off x="1083149" y="2048510"/>
+          <a:ext cx="6161376" cy="1024255"/>
+        </a:xfrm>
+        <a:prstGeom prst="rect">
+          <a:avLst/>
+        </a:prstGeom>
+        <a:noFill/>
+        <a:ln w="28575" cap="flat" cmpd="sng" algn="ctr">
+          <a:solidFill>
+            <a:srgbClr val="FE7E00"/>
+          </a:solidFill>
+          <a:prstDash val="solid"/>
+        </a:ln>
+        <a:effectLst/>
+      </dsp:spPr>
+      <dsp:style>
+        <a:lnRef idx="2">
+          <a:scrgbClr r="0" g="0" b="0"/>
+        </a:lnRef>
+        <a:fillRef idx="1">
+          <a:scrgbClr r="0" g="0" b="0"/>
+        </a:fillRef>
+        <a:effectRef idx="0">
+          <a:scrgbClr r="0" g="0" b="0"/>
+        </a:effectRef>
+        <a:fontRef idx="minor">
+          <a:schemeClr val="lt1"/>
+        </a:fontRef>
+      </dsp:style>
+      <dsp:txBody>
+        <a:bodyPr spcFirstLastPara="0" vert="horz" wrap="square" lIns="813002" tIns="78740" rIns="78740" bIns="78740" numCol="1" spcCol="1270" anchor="ctr" anchorCtr="0">
+          <a:noAutofit/>
+        </a:bodyPr>
+        <a:lstStyle/>
+        <a:p>
+          <a:pPr lvl="0" algn="l" defTabSz="1377950">
+            <a:lnSpc>
+              <a:spcPct val="90000"/>
+            </a:lnSpc>
+            <a:spcBef>
+              <a:spcPct val="0"/>
+            </a:spcBef>
+            <a:spcAft>
+              <a:spcPct val="35000"/>
+            </a:spcAft>
+          </a:pPr>
+          <a:r>
+            <a:rPr lang="en-US" sz="3100" b="1" kern="1200" dirty="0" smtClean="0">
+              <a:solidFill>
+                <a:srgbClr val="FFF271"/>
+              </a:solidFill>
+            </a:rPr>
+            <a:t>Create</a:t>
+          </a:r>
+          <a:r>
+            <a:rPr lang="en-US" sz="3100" kern="1200" dirty="0" smtClean="0">
+              <a:solidFill>
+                <a:srgbClr val="FFF271"/>
+              </a:solidFill>
+            </a:rPr>
+            <a:t> </a:t>
+          </a:r>
+          <a:r>
+            <a:rPr lang="en-US" sz="3100" kern="1200" dirty="0" smtClean="0">
+              <a:solidFill>
+                <a:schemeClr val="tx2"/>
+              </a:solidFill>
+            </a:rPr>
+            <a:t>more actors</a:t>
+          </a:r>
+          <a:endParaRPr lang="en-US" sz="3100" kern="1200" dirty="0">
+            <a:solidFill>
+              <a:schemeClr val="tx2"/>
+            </a:solidFill>
+          </a:endParaRPr>
+        </a:p>
+      </dsp:txBody>
+      <dsp:txXfrm>
+        <a:off x="1083149" y="2048510"/>
+        <a:ext cx="6161376" cy="1024255"/>
+      </dsp:txXfrm>
+    </dsp:sp>
+    <dsp:sp modelId="{9EDB11B3-6703-4A77-AE8C-106FD6DC8848}">
+      <dsp:nvSpPr>
+        <dsp:cNvPr id="0" name=""/>
+        <dsp:cNvSpPr/>
+      </dsp:nvSpPr>
+      <dsp:spPr>
+        <a:xfrm>
+          <a:off x="442990" y="1920478"/>
+          <a:ext cx="1280318" cy="1280318"/>
+        </a:xfrm>
+        <a:prstGeom prst="ellipse">
+          <a:avLst/>
+        </a:prstGeom>
+        <a:solidFill>
+          <a:schemeClr val="tx1"/>
+        </a:solidFill>
+        <a:ln w="57150" cap="flat" cmpd="sng" algn="ctr">
+          <a:solidFill>
+            <a:srgbClr val="FE7E00"/>
+          </a:solidFill>
+          <a:prstDash val="solid"/>
+        </a:ln>
+        <a:effectLst/>
+      </dsp:spPr>
+      <dsp:style>
+        <a:lnRef idx="2">
+          <a:scrgbClr r="0" g="0" b="0"/>
+        </a:lnRef>
+        <a:fillRef idx="1">
+          <a:scrgbClr r="0" g="0" b="0"/>
+        </a:fillRef>
+        <a:effectRef idx="0">
+          <a:scrgbClr r="0" g="0" b="0"/>
+        </a:effectRef>
+        <a:fontRef idx="minor"/>
+      </dsp:style>
+    </dsp:sp>
+    <dsp:sp modelId="{902D4B7F-8AF1-4461-BD5B-E51A2EF80DB7}">
+      <dsp:nvSpPr>
+        <dsp:cNvPr id="0" name=""/>
+        <dsp:cNvSpPr/>
+      </dsp:nvSpPr>
+      <dsp:spPr>
+        <a:xfrm>
+          <a:off x="710832" y="3584892"/>
+          <a:ext cx="6533693" cy="1024255"/>
+        </a:xfrm>
+        <a:prstGeom prst="rect">
+          <a:avLst/>
+        </a:prstGeom>
+        <a:noFill/>
+        <a:ln w="28575" cap="flat" cmpd="sng" algn="ctr">
+          <a:solidFill>
+            <a:srgbClr val="FE7E00"/>
+          </a:solidFill>
+          <a:prstDash val="solid"/>
+        </a:ln>
+        <a:effectLst/>
+      </dsp:spPr>
+      <dsp:style>
+        <a:lnRef idx="2">
+          <a:scrgbClr r="0" g="0" b="0"/>
+        </a:lnRef>
+        <a:fillRef idx="1">
+          <a:scrgbClr r="0" g="0" b="0"/>
+        </a:fillRef>
+        <a:effectRef idx="0">
+          <a:scrgbClr r="0" g="0" b="0"/>
+        </a:effectRef>
+        <a:fontRef idx="minor">
+          <a:schemeClr val="lt1"/>
+        </a:fontRef>
+      </dsp:style>
+      <dsp:txBody>
+        <a:bodyPr spcFirstLastPara="0" vert="horz" wrap="square" lIns="813002" tIns="78740" rIns="78740" bIns="78740" numCol="1" spcCol="1270" anchor="ctr" anchorCtr="0">
+          <a:noAutofit/>
+        </a:bodyPr>
+        <a:lstStyle/>
+        <a:p>
+          <a:pPr lvl="0" algn="l" defTabSz="1377950">
+            <a:lnSpc>
+              <a:spcPct val="90000"/>
+            </a:lnSpc>
+            <a:spcBef>
+              <a:spcPct val="0"/>
+            </a:spcBef>
+            <a:spcAft>
+              <a:spcPct val="35000"/>
+            </a:spcAft>
+          </a:pPr>
+          <a:r>
+            <a:rPr lang="en-US" sz="3100" b="1" kern="1200" dirty="0" smtClean="0">
+              <a:solidFill>
+                <a:srgbClr val="FFF271"/>
+              </a:solidFill>
+            </a:rPr>
+            <a:t>Send</a:t>
+          </a:r>
+          <a:r>
+            <a:rPr lang="en-US" sz="3100" kern="1200" dirty="0" smtClean="0">
+              <a:solidFill>
+                <a:srgbClr val="FFF271"/>
+              </a:solidFill>
+            </a:rPr>
+            <a:t> </a:t>
+          </a:r>
+          <a:r>
+            <a:rPr lang="en-US" sz="3100" kern="1200" dirty="0" smtClean="0">
+              <a:solidFill>
+                <a:schemeClr val="tx2"/>
+              </a:solidFill>
+            </a:rPr>
+            <a:t>messages to another actor</a:t>
+          </a:r>
+          <a:endParaRPr lang="en-US" sz="3100" kern="1200" dirty="0">
+            <a:solidFill>
+              <a:schemeClr val="tx2"/>
+            </a:solidFill>
+          </a:endParaRPr>
+        </a:p>
+      </dsp:txBody>
+      <dsp:txXfrm>
+        <a:off x="710832" y="3584892"/>
+        <a:ext cx="6533693" cy="1024255"/>
+      </dsp:txXfrm>
+    </dsp:sp>
+    <dsp:sp modelId="{82F4B5B5-A5E2-4FE3-A092-6FC5A51A450A}">
+      <dsp:nvSpPr>
+        <dsp:cNvPr id="0" name=""/>
+        <dsp:cNvSpPr/>
+      </dsp:nvSpPr>
+      <dsp:spPr>
+        <a:xfrm>
+          <a:off x="70673" y="3456860"/>
+          <a:ext cx="1280318" cy="1280318"/>
+        </a:xfrm>
+        <a:prstGeom prst="ellipse">
+          <a:avLst/>
+        </a:prstGeom>
+        <a:solidFill>
+          <a:schemeClr val="tx1"/>
+        </a:solidFill>
+        <a:ln w="57150" cap="flat" cmpd="sng" algn="ctr">
+          <a:solidFill>
+            <a:srgbClr val="FE7E00"/>
+          </a:solidFill>
+          <a:prstDash val="solid"/>
+        </a:ln>
+        <a:effectLst/>
+      </dsp:spPr>
+      <dsp:style>
+        <a:lnRef idx="2">
+          <a:scrgbClr r="0" g="0" b="0"/>
+        </a:lnRef>
+        <a:fillRef idx="1">
+          <a:scrgbClr r="0" g="0" b="0"/>
+        </a:fillRef>
+        <a:effectRef idx="0">
+          <a:scrgbClr r="0" g="0" b="0"/>
+        </a:effectRef>
+        <a:fontRef idx="minor"/>
+      </dsp:style>
+    </dsp:sp>
   </dsp:spTree>
 </dsp:drawing>
 </file>
@@ -7410,6 +9611,568 @@
       <dsp:cNvGrpSpPr/>
     </dsp:nvGrpSpPr>
     <dsp:grpSpPr/>
+    <dsp:sp modelId="{B56380F7-843D-48FD-AC1A-D1DBEDCF1B07}">
+      <dsp:nvSpPr>
+        <dsp:cNvPr id="0" name=""/>
+        <dsp:cNvSpPr/>
+      </dsp:nvSpPr>
+      <dsp:spPr>
+        <a:xfrm>
+          <a:off x="0" y="0"/>
+          <a:ext cx="5852160" cy="1126680"/>
+        </a:xfrm>
+        <a:prstGeom prst="roundRect">
+          <a:avLst>
+            <a:gd name="adj" fmla="val 10000"/>
+          </a:avLst>
+        </a:prstGeom>
+        <a:solidFill>
+          <a:srgbClr val="FE7E00"/>
+        </a:solidFill>
+        <a:ln w="10795" cap="flat" cmpd="sng" algn="ctr">
+          <a:solidFill>
+            <a:schemeClr val="lt1">
+              <a:hueOff val="0"/>
+              <a:satOff val="0"/>
+              <a:lumOff val="0"/>
+              <a:alphaOff val="0"/>
+            </a:schemeClr>
+          </a:solidFill>
+          <a:prstDash val="solid"/>
+        </a:ln>
+        <a:effectLst/>
+      </dsp:spPr>
+      <dsp:style>
+        <a:lnRef idx="2">
+          <a:scrgbClr r="0" g="0" b="0"/>
+        </a:lnRef>
+        <a:fillRef idx="1">
+          <a:scrgbClr r="0" g="0" b="0"/>
+        </a:fillRef>
+        <a:effectRef idx="0">
+          <a:scrgbClr r="0" g="0" b="0"/>
+        </a:effectRef>
+        <a:fontRef idx="minor">
+          <a:schemeClr val="lt1"/>
+        </a:fontRef>
+      </dsp:style>
+      <dsp:txBody>
+        <a:bodyPr spcFirstLastPara="0" vert="horz" wrap="square" lIns="99060" tIns="99060" rIns="99060" bIns="99060" numCol="1" spcCol="1270" anchor="ctr" anchorCtr="0">
+          <a:noAutofit/>
+        </a:bodyPr>
+        <a:lstStyle/>
+        <a:p>
+          <a:pPr lvl="0" algn="l" defTabSz="1155700" rtl="0">
+            <a:lnSpc>
+              <a:spcPct val="90000"/>
+            </a:lnSpc>
+            <a:spcBef>
+              <a:spcPct val="0"/>
+            </a:spcBef>
+            <a:spcAft>
+              <a:spcPct val="35000"/>
+            </a:spcAft>
+          </a:pPr>
+          <a:r>
+            <a:rPr lang="en-US" sz="2600" kern="1200" dirty="0" smtClean="0">
+              <a:solidFill>
+                <a:schemeClr val="tx2"/>
+              </a:solidFill>
+            </a:rPr>
+            <a:t>dynamic creation of actors</a:t>
+          </a:r>
+          <a:endParaRPr lang="en-US" sz="2600" kern="1200" dirty="0">
+            <a:solidFill>
+              <a:schemeClr val="tx2"/>
+            </a:solidFill>
+          </a:endParaRPr>
+        </a:p>
+      </dsp:txBody>
+      <dsp:txXfrm>
+        <a:off x="32999" y="32999"/>
+        <a:ext cx="4541180" cy="1060682"/>
+      </dsp:txXfrm>
+    </dsp:sp>
+    <dsp:sp modelId="{FE590F36-70C5-4FE2-B49A-24F07CF41702}">
+      <dsp:nvSpPr>
+        <dsp:cNvPr id="0" name=""/>
+        <dsp:cNvSpPr/>
+      </dsp:nvSpPr>
+      <dsp:spPr>
+        <a:xfrm>
+          <a:off x="490118" y="1331531"/>
+          <a:ext cx="5852160" cy="1126680"/>
+        </a:xfrm>
+        <a:prstGeom prst="roundRect">
+          <a:avLst>
+            <a:gd name="adj" fmla="val 10000"/>
+          </a:avLst>
+        </a:prstGeom>
+        <a:solidFill>
+          <a:srgbClr val="FE7E00"/>
+        </a:solidFill>
+        <a:ln w="10795" cap="flat" cmpd="sng" algn="ctr">
+          <a:solidFill>
+            <a:schemeClr val="lt1">
+              <a:hueOff val="0"/>
+              <a:satOff val="0"/>
+              <a:lumOff val="0"/>
+              <a:alphaOff val="0"/>
+            </a:schemeClr>
+          </a:solidFill>
+          <a:prstDash val="solid"/>
+        </a:ln>
+        <a:effectLst/>
+      </dsp:spPr>
+      <dsp:style>
+        <a:lnRef idx="2">
+          <a:scrgbClr r="0" g="0" b="0"/>
+        </a:lnRef>
+        <a:fillRef idx="1">
+          <a:scrgbClr r="0" g="0" b="0"/>
+        </a:fillRef>
+        <a:effectRef idx="0">
+          <a:scrgbClr r="0" g="0" b="0"/>
+        </a:effectRef>
+        <a:fontRef idx="minor">
+          <a:schemeClr val="lt1"/>
+        </a:fontRef>
+      </dsp:style>
+      <dsp:txBody>
+        <a:bodyPr spcFirstLastPara="0" vert="horz" wrap="square" lIns="99060" tIns="99060" rIns="99060" bIns="99060" numCol="1" spcCol="1270" anchor="ctr" anchorCtr="0">
+          <a:noAutofit/>
+        </a:bodyPr>
+        <a:lstStyle/>
+        <a:p>
+          <a:pPr lvl="0" algn="l" defTabSz="1155700" rtl="0">
+            <a:lnSpc>
+              <a:spcPct val="90000"/>
+            </a:lnSpc>
+            <a:spcBef>
+              <a:spcPct val="0"/>
+            </a:spcBef>
+            <a:spcAft>
+              <a:spcPct val="35000"/>
+            </a:spcAft>
+          </a:pPr>
+          <a:r>
+            <a:rPr lang="en-US" sz="2600" kern="1200" dirty="0" smtClean="0">
+              <a:solidFill>
+                <a:schemeClr val="tx2"/>
+              </a:solidFill>
+            </a:rPr>
+            <a:t>inclusion of actor addresses in messages</a:t>
+          </a:r>
+          <a:endParaRPr lang="en-US" sz="2600" kern="1200" dirty="0">
+            <a:solidFill>
+              <a:schemeClr val="tx2"/>
+            </a:solidFill>
+          </a:endParaRPr>
+        </a:p>
+      </dsp:txBody>
+      <dsp:txXfrm>
+        <a:off x="523117" y="1364530"/>
+        <a:ext cx="4563701" cy="1060682"/>
+      </dsp:txXfrm>
+    </dsp:sp>
+    <dsp:sp modelId="{226C28B7-1C0F-49EC-B073-1B4B6DC5D86B}">
+      <dsp:nvSpPr>
+        <dsp:cNvPr id="0" name=""/>
+        <dsp:cNvSpPr/>
+      </dsp:nvSpPr>
+      <dsp:spPr>
+        <a:xfrm>
+          <a:off x="972921" y="2663063"/>
+          <a:ext cx="5852160" cy="1126680"/>
+        </a:xfrm>
+        <a:prstGeom prst="roundRect">
+          <a:avLst>
+            <a:gd name="adj" fmla="val 10000"/>
+          </a:avLst>
+        </a:prstGeom>
+        <a:solidFill>
+          <a:srgbClr val="FE7E00"/>
+        </a:solidFill>
+        <a:ln w="10795" cap="flat" cmpd="sng" algn="ctr">
+          <a:solidFill>
+            <a:schemeClr val="lt1">
+              <a:hueOff val="0"/>
+              <a:satOff val="0"/>
+              <a:lumOff val="0"/>
+              <a:alphaOff val="0"/>
+            </a:schemeClr>
+          </a:solidFill>
+          <a:prstDash val="solid"/>
+        </a:ln>
+        <a:effectLst/>
+      </dsp:spPr>
+      <dsp:style>
+        <a:lnRef idx="2">
+          <a:scrgbClr r="0" g="0" b="0"/>
+        </a:lnRef>
+        <a:fillRef idx="1">
+          <a:scrgbClr r="0" g="0" b="0"/>
+        </a:fillRef>
+        <a:effectRef idx="0">
+          <a:scrgbClr r="0" g="0" b="0"/>
+        </a:effectRef>
+        <a:fontRef idx="minor">
+          <a:schemeClr val="lt1"/>
+        </a:fontRef>
+      </dsp:style>
+      <dsp:txBody>
+        <a:bodyPr spcFirstLastPara="0" vert="horz" wrap="square" lIns="99060" tIns="99060" rIns="99060" bIns="99060" numCol="1" spcCol="1270" anchor="ctr" anchorCtr="0">
+          <a:noAutofit/>
+        </a:bodyPr>
+        <a:lstStyle/>
+        <a:p>
+          <a:pPr lvl="0" algn="l" defTabSz="1155700" rtl="0">
+            <a:lnSpc>
+              <a:spcPct val="90000"/>
+            </a:lnSpc>
+            <a:spcBef>
+              <a:spcPct val="0"/>
+            </a:spcBef>
+            <a:spcAft>
+              <a:spcPct val="35000"/>
+            </a:spcAft>
+          </a:pPr>
+          <a:r>
+            <a:rPr lang="en-US" sz="2600" kern="1200" dirty="0" smtClean="0">
+              <a:solidFill>
+                <a:schemeClr val="tx2"/>
+              </a:solidFill>
+            </a:rPr>
+            <a:t>interaction only through direct asynchronous message passing </a:t>
+          </a:r>
+          <a:endParaRPr lang="en-US" sz="2600" kern="1200" dirty="0">
+            <a:solidFill>
+              <a:schemeClr val="tx2"/>
+            </a:solidFill>
+          </a:endParaRPr>
+        </a:p>
+      </dsp:txBody>
+      <dsp:txXfrm>
+        <a:off x="1005920" y="2696062"/>
+        <a:ext cx="4571016" cy="1060682"/>
+      </dsp:txXfrm>
+    </dsp:sp>
+    <dsp:sp modelId="{A6C7CB61-6D7A-46EB-8DF6-8347375DF2F5}">
+      <dsp:nvSpPr>
+        <dsp:cNvPr id="0" name=""/>
+        <dsp:cNvSpPr/>
+      </dsp:nvSpPr>
+      <dsp:spPr>
+        <a:xfrm>
+          <a:off x="1463039" y="3994594"/>
+          <a:ext cx="5852160" cy="1126680"/>
+        </a:xfrm>
+        <a:prstGeom prst="roundRect">
+          <a:avLst>
+            <a:gd name="adj" fmla="val 10000"/>
+          </a:avLst>
+        </a:prstGeom>
+        <a:solidFill>
+          <a:srgbClr val="FE7E00"/>
+        </a:solidFill>
+        <a:ln w="10795" cap="flat" cmpd="sng" algn="ctr">
+          <a:solidFill>
+            <a:schemeClr val="lt1">
+              <a:hueOff val="0"/>
+              <a:satOff val="0"/>
+              <a:lumOff val="0"/>
+              <a:alphaOff val="0"/>
+            </a:schemeClr>
+          </a:solidFill>
+          <a:prstDash val="solid"/>
+        </a:ln>
+        <a:effectLst/>
+      </dsp:spPr>
+      <dsp:style>
+        <a:lnRef idx="2">
+          <a:scrgbClr r="0" g="0" b="0"/>
+        </a:lnRef>
+        <a:fillRef idx="1">
+          <a:scrgbClr r="0" g="0" b="0"/>
+        </a:fillRef>
+        <a:effectRef idx="0">
+          <a:scrgbClr r="0" g="0" b="0"/>
+        </a:effectRef>
+        <a:fontRef idx="minor">
+          <a:schemeClr val="lt1"/>
+        </a:fontRef>
+      </dsp:style>
+      <dsp:txBody>
+        <a:bodyPr spcFirstLastPara="0" vert="horz" wrap="square" lIns="99060" tIns="99060" rIns="99060" bIns="99060" numCol="1" spcCol="1270" anchor="ctr" anchorCtr="0">
+          <a:noAutofit/>
+        </a:bodyPr>
+        <a:lstStyle/>
+        <a:p>
+          <a:pPr lvl="0" algn="l" defTabSz="1155700" rtl="0">
+            <a:lnSpc>
+              <a:spcPct val="90000"/>
+            </a:lnSpc>
+            <a:spcBef>
+              <a:spcPct val="0"/>
+            </a:spcBef>
+            <a:spcAft>
+              <a:spcPct val="35000"/>
+            </a:spcAft>
+          </a:pPr>
+          <a:r>
+            <a:rPr lang="en-US" sz="2600" kern="1200" dirty="0" smtClean="0">
+              <a:solidFill>
+                <a:schemeClr val="tx2"/>
+              </a:solidFill>
+            </a:rPr>
+            <a:t>no restriction on message arrival order</a:t>
+          </a:r>
+          <a:endParaRPr lang="en-US" sz="2600" kern="1200" dirty="0">
+            <a:solidFill>
+              <a:schemeClr val="tx2"/>
+            </a:solidFill>
+          </a:endParaRPr>
+        </a:p>
+      </dsp:txBody>
+      <dsp:txXfrm>
+        <a:off x="1496038" y="4027593"/>
+        <a:ext cx="4563701" cy="1060682"/>
+      </dsp:txXfrm>
+    </dsp:sp>
+    <dsp:sp modelId="{4C6629DC-ED83-4C24-918E-02A809AE514C}">
+      <dsp:nvSpPr>
+        <dsp:cNvPr id="0" name=""/>
+        <dsp:cNvSpPr/>
+      </dsp:nvSpPr>
+      <dsp:spPr>
+        <a:xfrm>
+          <a:off x="5119817" y="862934"/>
+          <a:ext cx="732342" cy="732342"/>
+        </a:xfrm>
+        <a:prstGeom prst="downArrow">
+          <a:avLst>
+            <a:gd name="adj1" fmla="val 55000"/>
+            <a:gd name="adj2" fmla="val 45000"/>
+          </a:avLst>
+        </a:prstGeom>
+        <a:solidFill>
+          <a:schemeClr val="accent2">
+            <a:alpha val="90000"/>
+            <a:tint val="40000"/>
+            <a:hueOff val="0"/>
+            <a:satOff val="0"/>
+            <a:lumOff val="0"/>
+            <a:alphaOff val="0"/>
+          </a:schemeClr>
+        </a:solidFill>
+        <a:ln w="10795" cap="flat" cmpd="sng" algn="ctr">
+          <a:solidFill>
+            <a:schemeClr val="accent2">
+              <a:alpha val="90000"/>
+              <a:tint val="40000"/>
+              <a:hueOff val="0"/>
+              <a:satOff val="0"/>
+              <a:lumOff val="0"/>
+              <a:alphaOff val="0"/>
+            </a:schemeClr>
+          </a:solidFill>
+          <a:prstDash val="solid"/>
+        </a:ln>
+        <a:effectLst/>
+      </dsp:spPr>
+      <dsp:style>
+        <a:lnRef idx="2">
+          <a:scrgbClr r="0" g="0" b="0"/>
+        </a:lnRef>
+        <a:fillRef idx="1">
+          <a:scrgbClr r="0" g="0" b="0"/>
+        </a:fillRef>
+        <a:effectRef idx="0">
+          <a:scrgbClr r="0" g="0" b="0"/>
+        </a:effectRef>
+        <a:fontRef idx="minor"/>
+      </dsp:style>
+      <dsp:txBody>
+        <a:bodyPr spcFirstLastPara="0" vert="horz" wrap="square" lIns="41910" tIns="41910" rIns="41910" bIns="41910" numCol="1" spcCol="1270" anchor="ctr" anchorCtr="0">
+          <a:noAutofit/>
+        </a:bodyPr>
+        <a:lstStyle/>
+        <a:p>
+          <a:pPr lvl="0" algn="ctr" defTabSz="1466850">
+            <a:lnSpc>
+              <a:spcPct val="90000"/>
+            </a:lnSpc>
+            <a:spcBef>
+              <a:spcPct val="0"/>
+            </a:spcBef>
+            <a:spcAft>
+              <a:spcPct val="35000"/>
+            </a:spcAft>
+          </a:pPr>
+          <a:endParaRPr lang="en-US" sz="3300" kern="1200"/>
+        </a:p>
+      </dsp:txBody>
+      <dsp:txXfrm>
+        <a:off x="5284594" y="862934"/>
+        <a:ext cx="402788" cy="551087"/>
+      </dsp:txXfrm>
+    </dsp:sp>
+    <dsp:sp modelId="{F2539A5F-1E25-4AC9-8B24-A0563841837E}">
+      <dsp:nvSpPr>
+        <dsp:cNvPr id="0" name=""/>
+        <dsp:cNvSpPr/>
+      </dsp:nvSpPr>
+      <dsp:spPr>
+        <a:xfrm>
+          <a:off x="5609936" y="2194466"/>
+          <a:ext cx="732342" cy="732342"/>
+        </a:xfrm>
+        <a:prstGeom prst="downArrow">
+          <a:avLst>
+            <a:gd name="adj1" fmla="val 55000"/>
+            <a:gd name="adj2" fmla="val 45000"/>
+          </a:avLst>
+        </a:prstGeom>
+        <a:solidFill>
+          <a:schemeClr val="accent2">
+            <a:alpha val="90000"/>
+            <a:tint val="40000"/>
+            <a:hueOff val="0"/>
+            <a:satOff val="0"/>
+            <a:lumOff val="0"/>
+            <a:alphaOff val="0"/>
+          </a:schemeClr>
+        </a:solidFill>
+        <a:ln w="10795" cap="flat" cmpd="sng" algn="ctr">
+          <a:solidFill>
+            <a:schemeClr val="accent2">
+              <a:alpha val="90000"/>
+              <a:tint val="40000"/>
+              <a:hueOff val="0"/>
+              <a:satOff val="0"/>
+              <a:lumOff val="0"/>
+              <a:alphaOff val="0"/>
+            </a:schemeClr>
+          </a:solidFill>
+          <a:prstDash val="solid"/>
+        </a:ln>
+        <a:effectLst/>
+      </dsp:spPr>
+      <dsp:style>
+        <a:lnRef idx="2">
+          <a:scrgbClr r="0" g="0" b="0"/>
+        </a:lnRef>
+        <a:fillRef idx="1">
+          <a:scrgbClr r="0" g="0" b="0"/>
+        </a:fillRef>
+        <a:effectRef idx="0">
+          <a:scrgbClr r="0" g="0" b="0"/>
+        </a:effectRef>
+        <a:fontRef idx="minor"/>
+      </dsp:style>
+      <dsp:txBody>
+        <a:bodyPr spcFirstLastPara="0" vert="horz" wrap="square" lIns="41910" tIns="41910" rIns="41910" bIns="41910" numCol="1" spcCol="1270" anchor="ctr" anchorCtr="0">
+          <a:noAutofit/>
+        </a:bodyPr>
+        <a:lstStyle/>
+        <a:p>
+          <a:pPr lvl="0" algn="ctr" defTabSz="1466850">
+            <a:lnSpc>
+              <a:spcPct val="90000"/>
+            </a:lnSpc>
+            <a:spcBef>
+              <a:spcPct val="0"/>
+            </a:spcBef>
+            <a:spcAft>
+              <a:spcPct val="35000"/>
+            </a:spcAft>
+          </a:pPr>
+          <a:endParaRPr lang="en-US" sz="3300" kern="1200"/>
+        </a:p>
+      </dsp:txBody>
+      <dsp:txXfrm>
+        <a:off x="5774713" y="2194466"/>
+        <a:ext cx="402788" cy="551087"/>
+      </dsp:txXfrm>
+    </dsp:sp>
+    <dsp:sp modelId="{F04B7FFE-5806-44C7-86F3-D924A32EA1F0}">
+      <dsp:nvSpPr>
+        <dsp:cNvPr id="0" name=""/>
+        <dsp:cNvSpPr/>
+      </dsp:nvSpPr>
+      <dsp:spPr>
+        <a:xfrm>
+          <a:off x="6092739" y="3525997"/>
+          <a:ext cx="732342" cy="732342"/>
+        </a:xfrm>
+        <a:prstGeom prst="downArrow">
+          <a:avLst>
+            <a:gd name="adj1" fmla="val 55000"/>
+            <a:gd name="adj2" fmla="val 45000"/>
+          </a:avLst>
+        </a:prstGeom>
+        <a:solidFill>
+          <a:schemeClr val="accent2">
+            <a:alpha val="90000"/>
+            <a:tint val="40000"/>
+            <a:hueOff val="0"/>
+            <a:satOff val="0"/>
+            <a:lumOff val="0"/>
+            <a:alphaOff val="0"/>
+          </a:schemeClr>
+        </a:solidFill>
+        <a:ln w="10795" cap="flat" cmpd="sng" algn="ctr">
+          <a:solidFill>
+            <a:schemeClr val="accent2">
+              <a:alpha val="90000"/>
+              <a:tint val="40000"/>
+              <a:hueOff val="0"/>
+              <a:satOff val="0"/>
+              <a:lumOff val="0"/>
+              <a:alphaOff val="0"/>
+            </a:schemeClr>
+          </a:solidFill>
+          <a:prstDash val="solid"/>
+        </a:ln>
+        <a:effectLst/>
+      </dsp:spPr>
+      <dsp:style>
+        <a:lnRef idx="2">
+          <a:scrgbClr r="0" g="0" b="0"/>
+        </a:lnRef>
+        <a:fillRef idx="1">
+          <a:scrgbClr r="0" g="0" b="0"/>
+        </a:fillRef>
+        <a:effectRef idx="0">
+          <a:scrgbClr r="0" g="0" b="0"/>
+        </a:effectRef>
+        <a:fontRef idx="minor"/>
+      </dsp:style>
+      <dsp:txBody>
+        <a:bodyPr spcFirstLastPara="0" vert="horz" wrap="square" lIns="41910" tIns="41910" rIns="41910" bIns="41910" numCol="1" spcCol="1270" anchor="ctr" anchorCtr="0">
+          <a:noAutofit/>
+        </a:bodyPr>
+        <a:lstStyle/>
+        <a:p>
+          <a:pPr lvl="0" algn="ctr" defTabSz="1466850">
+            <a:lnSpc>
+              <a:spcPct val="90000"/>
+            </a:lnSpc>
+            <a:spcBef>
+              <a:spcPct val="0"/>
+            </a:spcBef>
+            <a:spcAft>
+              <a:spcPct val="35000"/>
+            </a:spcAft>
+          </a:pPr>
+          <a:endParaRPr lang="en-US" sz="3300" kern="1200"/>
+        </a:p>
+      </dsp:txBody>
+      <dsp:txXfrm>
+        <a:off x="6257516" y="3525997"/>
+        <a:ext cx="402788" cy="551087"/>
+      </dsp:txXfrm>
+    </dsp:sp>
   </dsp:spTree>
 </dsp:drawing>
 </file>
@@ -7422,6 +10185,740 @@
       <dsp:cNvGrpSpPr/>
     </dsp:nvGrpSpPr>
     <dsp:grpSpPr/>
+    <dsp:sp modelId="{097860A2-8540-423B-B862-127812E87646}">
+      <dsp:nvSpPr>
+        <dsp:cNvPr id="0" name=""/>
+        <dsp:cNvSpPr/>
+      </dsp:nvSpPr>
+      <dsp:spPr>
+        <a:xfrm>
+          <a:off x="842597" y="2413193"/>
+          <a:ext cx="1826153" cy="1826455"/>
+        </a:xfrm>
+        <a:prstGeom prst="ellipse">
+          <a:avLst/>
+        </a:prstGeom>
+        <a:solidFill>
+          <a:srgbClr val="FE7E00"/>
+        </a:solidFill>
+        <a:ln w="9525" cap="flat" cmpd="sng" algn="ctr">
+          <a:solidFill>
+            <a:srgbClr val="FE7E00"/>
+          </a:solidFill>
+          <a:prstDash val="solid"/>
+        </a:ln>
+        <a:effectLst>
+          <a:outerShdw blurRad="44450" dist="13970" dir="5400000" algn="ctr" rotWithShape="0">
+            <a:srgbClr val="000000">
+              <a:alpha val="45000"/>
+            </a:srgbClr>
+          </a:outerShdw>
+        </a:effectLst>
+        <a:scene3d>
+          <a:camera prst="orthographicFront">
+            <a:rot lat="0" lon="0" rev="0"/>
+          </a:camera>
+          <a:lightRig rig="twoPt" dir="tl"/>
+        </a:scene3d>
+        <a:sp3d prstMaterial="flat">
+          <a:bevelT w="12700" h="25400" prst="coolSlant"/>
+        </a:sp3d>
+      </dsp:spPr>
+      <dsp:style>
+        <a:lnRef idx="1">
+          <a:scrgbClr r="0" g="0" b="0"/>
+        </a:lnRef>
+        <a:fillRef idx="3">
+          <a:scrgbClr r="0" g="0" b="0"/>
+        </a:fillRef>
+        <a:effectRef idx="3">
+          <a:scrgbClr r="0" g="0" b="0"/>
+        </a:effectRef>
+        <a:fontRef idx="minor">
+          <a:schemeClr val="lt1"/>
+        </a:fontRef>
+      </dsp:style>
+    </dsp:sp>
+    <dsp:sp modelId="{B9992169-4D10-41F1-B981-2A9302527811}">
+      <dsp:nvSpPr>
+        <dsp:cNvPr id="0" name=""/>
+        <dsp:cNvSpPr/>
+      </dsp:nvSpPr>
+      <dsp:spPr>
+        <a:xfrm>
+          <a:off x="3023195" y="2064971"/>
+          <a:ext cx="542353" cy="542005"/>
+        </a:xfrm>
+        <a:prstGeom prst="donut">
+          <a:avLst>
+            <a:gd name="adj" fmla="val 7460"/>
+          </a:avLst>
+        </a:prstGeom>
+        <a:solidFill>
+          <a:srgbClr val="FE7E00"/>
+        </a:solidFill>
+        <a:ln w="9525" cap="flat" cmpd="sng" algn="ctr">
+          <a:solidFill>
+            <a:srgbClr val="FE7E00"/>
+          </a:solidFill>
+          <a:prstDash val="solid"/>
+        </a:ln>
+        <a:effectLst>
+          <a:outerShdw blurRad="44450" dist="13970" dir="5400000" algn="ctr" rotWithShape="0">
+            <a:srgbClr val="000000">
+              <a:alpha val="45000"/>
+            </a:srgbClr>
+          </a:outerShdw>
+        </a:effectLst>
+        <a:scene3d>
+          <a:camera prst="orthographicFront">
+            <a:rot lat="0" lon="0" rev="0"/>
+          </a:camera>
+          <a:lightRig rig="twoPt" dir="tl"/>
+        </a:scene3d>
+        <a:sp3d prstMaterial="flat">
+          <a:bevelT w="12700" h="25400" prst="coolSlant"/>
+        </a:sp3d>
+      </dsp:spPr>
+      <dsp:style>
+        <a:lnRef idx="1">
+          <a:scrgbClr r="0" g="0" b="0"/>
+        </a:lnRef>
+        <a:fillRef idx="3">
+          <a:scrgbClr r="0" g="0" b="0"/>
+        </a:fillRef>
+        <a:effectRef idx="3">
+          <a:scrgbClr r="0" g="0" b="0"/>
+        </a:effectRef>
+        <a:fontRef idx="minor">
+          <a:schemeClr val="lt1"/>
+        </a:fontRef>
+      </dsp:style>
+    </dsp:sp>
+    <dsp:sp modelId="{7B73D9F2-AEB8-47F1-BF4C-BAD85B74A84B}">
+      <dsp:nvSpPr>
+        <dsp:cNvPr id="0" name=""/>
+        <dsp:cNvSpPr/>
+      </dsp:nvSpPr>
+      <dsp:spPr>
+        <a:xfrm>
+          <a:off x="912764" y="2483283"/>
+          <a:ext cx="1686560" cy="1686275"/>
+        </a:xfrm>
+        <a:prstGeom prst="ellipse">
+          <a:avLst/>
+        </a:prstGeom>
+        <a:solidFill>
+          <a:schemeClr val="tx1"/>
+        </a:solidFill>
+        <a:ln>
+          <a:noFill/>
+        </a:ln>
+        <a:effectLst>
+          <a:outerShdw blurRad="44450" dist="13970" dir="5400000" algn="ctr" rotWithShape="0">
+            <a:srgbClr val="000000">
+              <a:alpha val="45000"/>
+            </a:srgbClr>
+          </a:outerShdw>
+        </a:effectLst>
+        <a:scene3d>
+          <a:camera prst="orthographicFront">
+            <a:rot lat="0" lon="0" rev="0"/>
+          </a:camera>
+          <a:lightRig rig="twoPt" dir="tl"/>
+        </a:scene3d>
+        <a:sp3d prstMaterial="flat">
+          <a:bevelT w="12700" h="25400" prst="coolSlant"/>
+        </a:sp3d>
+      </dsp:spPr>
+      <dsp:style>
+        <a:lnRef idx="0">
+          <a:scrgbClr r="0" g="0" b="0"/>
+        </a:lnRef>
+        <a:fillRef idx="1">
+          <a:scrgbClr r="0" g="0" b="0"/>
+        </a:fillRef>
+        <a:effectRef idx="3">
+          <a:scrgbClr r="0" g="0" b="0"/>
+        </a:effectRef>
+        <a:fontRef idx="minor"/>
+      </dsp:style>
+    </dsp:sp>
+    <dsp:sp modelId="{63A14301-43C1-4A33-9F5D-AE3D9AD6A279}">
+      <dsp:nvSpPr>
+        <dsp:cNvPr id="0" name=""/>
+        <dsp:cNvSpPr/>
+      </dsp:nvSpPr>
+      <dsp:spPr>
+        <a:xfrm>
+          <a:off x="3066491" y="3190840"/>
+          <a:ext cx="955793" cy="955566"/>
+        </a:xfrm>
+        <a:prstGeom prst="ellipse">
+          <a:avLst/>
+        </a:prstGeom>
+        <a:solidFill>
+          <a:srgbClr val="FE7E00"/>
+        </a:solidFill>
+        <a:ln w="9525" cap="flat" cmpd="sng" algn="ctr">
+          <a:solidFill>
+            <a:srgbClr val="FE7E00"/>
+          </a:solidFill>
+          <a:prstDash val="solid"/>
+        </a:ln>
+        <a:effectLst>
+          <a:outerShdw blurRad="44450" dist="13970" dir="5400000" algn="ctr" rotWithShape="0">
+            <a:srgbClr val="000000">
+              <a:alpha val="45000"/>
+            </a:srgbClr>
+          </a:outerShdw>
+        </a:effectLst>
+        <a:scene3d>
+          <a:camera prst="orthographicFront">
+            <a:rot lat="0" lon="0" rev="0"/>
+          </a:camera>
+          <a:lightRig rig="twoPt" dir="tl"/>
+        </a:scene3d>
+        <a:sp3d prstMaterial="flat">
+          <a:bevelT w="12700" h="25400" prst="coolSlant"/>
+        </a:sp3d>
+      </dsp:spPr>
+      <dsp:style>
+        <a:lnRef idx="1">
+          <a:scrgbClr r="0" g="0" b="0"/>
+        </a:lnRef>
+        <a:fillRef idx="3">
+          <a:scrgbClr r="0" g="0" b="0"/>
+        </a:fillRef>
+        <a:effectRef idx="3">
+          <a:scrgbClr r="0" g="0" b="0"/>
+        </a:effectRef>
+        <a:fontRef idx="minor">
+          <a:schemeClr val="lt1"/>
+        </a:fontRef>
+      </dsp:style>
+    </dsp:sp>
+    <dsp:sp modelId="{B9D895AD-AD59-4BB9-A9E9-F868AB80BF3F}">
+      <dsp:nvSpPr>
+        <dsp:cNvPr id="0" name=""/>
+        <dsp:cNvSpPr/>
+      </dsp:nvSpPr>
+      <dsp:spPr>
+        <a:xfrm>
+          <a:off x="3126762" y="3251122"/>
+          <a:ext cx="842898" cy="842979"/>
+        </a:xfrm>
+        <a:prstGeom prst="ellipse">
+          <a:avLst/>
+        </a:prstGeom>
+        <a:solidFill>
+          <a:schemeClr val="tx1"/>
+        </a:solidFill>
+        <a:ln>
+          <a:noFill/>
+        </a:ln>
+        <a:effectLst>
+          <a:outerShdw blurRad="44450" dist="13970" dir="5400000" algn="ctr" rotWithShape="0">
+            <a:srgbClr val="000000">
+              <a:alpha val="45000"/>
+            </a:srgbClr>
+          </a:outerShdw>
+        </a:effectLst>
+        <a:scene3d>
+          <a:camera prst="orthographicFront">
+            <a:rot lat="0" lon="0" rev="0"/>
+          </a:camera>
+          <a:lightRig rig="twoPt" dir="tl"/>
+        </a:scene3d>
+        <a:sp3d prstMaterial="flat">
+          <a:bevelT w="12700" h="25400" prst="coolSlant"/>
+        </a:sp3d>
+      </dsp:spPr>
+      <dsp:style>
+        <a:lnRef idx="0">
+          <a:scrgbClr r="0" g="0" b="0"/>
+        </a:lnRef>
+        <a:fillRef idx="1">
+          <a:scrgbClr r="0" g="0" b="0"/>
+        </a:fillRef>
+        <a:effectRef idx="3">
+          <a:scrgbClr r="0" g="0" b="0"/>
+        </a:effectRef>
+        <a:fontRef idx="minor"/>
+      </dsp:style>
+    </dsp:sp>
+    <dsp:sp modelId="{6C46406E-2571-4143-A56A-6BFA4DD92624}">
+      <dsp:nvSpPr>
+        <dsp:cNvPr id="0" name=""/>
+        <dsp:cNvSpPr/>
+      </dsp:nvSpPr>
+      <dsp:spPr>
+        <a:xfrm>
+          <a:off x="3565566" y="1027013"/>
+          <a:ext cx="1225063" cy="1225459"/>
+        </a:xfrm>
+        <a:prstGeom prst="ellipse">
+          <a:avLst/>
+        </a:prstGeom>
+        <a:solidFill>
+          <a:srgbClr val="FE7E00"/>
+        </a:solidFill>
+        <a:ln w="9525" cap="flat" cmpd="sng" algn="ctr">
+          <a:solidFill>
+            <a:srgbClr val="FE7E00"/>
+          </a:solidFill>
+          <a:prstDash val="solid"/>
+        </a:ln>
+        <a:effectLst>
+          <a:outerShdw blurRad="44450" dist="13970" dir="5400000" algn="ctr" rotWithShape="0">
+            <a:srgbClr val="000000">
+              <a:alpha val="45000"/>
+            </a:srgbClr>
+          </a:outerShdw>
+        </a:effectLst>
+        <a:scene3d>
+          <a:camera prst="orthographicFront">
+            <a:rot lat="0" lon="0" rev="0"/>
+          </a:camera>
+          <a:lightRig rig="twoPt" dir="tl"/>
+        </a:scene3d>
+        <a:sp3d prstMaterial="flat">
+          <a:bevelT w="12700" h="25400" prst="coolSlant"/>
+        </a:sp3d>
+      </dsp:spPr>
+      <dsp:style>
+        <a:lnRef idx="1">
+          <a:scrgbClr r="0" g="0" b="0"/>
+        </a:lnRef>
+        <a:fillRef idx="3">
+          <a:scrgbClr r="0" g="0" b="0"/>
+        </a:fillRef>
+        <a:effectRef idx="3">
+          <a:scrgbClr r="0" g="0" b="0"/>
+        </a:effectRef>
+        <a:fontRef idx="minor">
+          <a:schemeClr val="lt1"/>
+        </a:fontRef>
+      </dsp:style>
+    </dsp:sp>
+    <dsp:sp modelId="{9D377787-D9A0-4D12-8960-746D31DA049C}">
+      <dsp:nvSpPr>
+        <dsp:cNvPr id="0" name=""/>
+        <dsp:cNvSpPr/>
+      </dsp:nvSpPr>
+      <dsp:spPr>
+        <a:xfrm>
+          <a:off x="4591703" y="404532"/>
+          <a:ext cx="401235" cy="401509"/>
+        </a:xfrm>
+        <a:prstGeom prst="donut">
+          <a:avLst>
+            <a:gd name="adj" fmla="val 7460"/>
+          </a:avLst>
+        </a:prstGeom>
+        <a:solidFill>
+          <a:srgbClr val="FE7E00"/>
+        </a:solidFill>
+        <a:ln w="9525" cap="flat" cmpd="sng" algn="ctr">
+          <a:solidFill>
+            <a:srgbClr val="FE7E00"/>
+          </a:solidFill>
+          <a:prstDash val="solid"/>
+        </a:ln>
+        <a:effectLst>
+          <a:outerShdw blurRad="44450" dist="13970" dir="5400000" algn="ctr" rotWithShape="0">
+            <a:srgbClr val="000000">
+              <a:alpha val="45000"/>
+            </a:srgbClr>
+          </a:outerShdw>
+        </a:effectLst>
+        <a:scene3d>
+          <a:camera prst="orthographicFront">
+            <a:rot lat="0" lon="0" rev="0"/>
+          </a:camera>
+          <a:lightRig rig="twoPt" dir="tl"/>
+        </a:scene3d>
+        <a:sp3d prstMaterial="flat">
+          <a:bevelT w="12700" h="25400" prst="coolSlant"/>
+        </a:sp3d>
+      </dsp:spPr>
+      <dsp:style>
+        <a:lnRef idx="1">
+          <a:scrgbClr r="0" g="0" b="0"/>
+        </a:lnRef>
+        <a:fillRef idx="3">
+          <a:scrgbClr r="0" g="0" b="0"/>
+        </a:fillRef>
+        <a:effectRef idx="3">
+          <a:scrgbClr r="0" g="0" b="0"/>
+        </a:effectRef>
+        <a:fontRef idx="minor">
+          <a:schemeClr val="lt1"/>
+        </a:fontRef>
+      </dsp:style>
+    </dsp:sp>
+    <dsp:sp modelId="{B3A2F1D3-A934-451F-AE87-81E03C5A26F5}">
+      <dsp:nvSpPr>
+        <dsp:cNvPr id="0" name=""/>
+        <dsp:cNvSpPr/>
+      </dsp:nvSpPr>
+      <dsp:spPr>
+        <a:xfrm>
+          <a:off x="3799343" y="2617371"/>
+          <a:ext cx="301307" cy="300973"/>
+        </a:xfrm>
+        <a:prstGeom prst="donut">
+          <a:avLst>
+            <a:gd name="adj" fmla="val 7460"/>
+          </a:avLst>
+        </a:prstGeom>
+        <a:solidFill>
+          <a:srgbClr val="FE7E00"/>
+        </a:solidFill>
+        <a:ln w="9525" cap="flat" cmpd="sng" algn="ctr">
+          <a:solidFill>
+            <a:srgbClr val="FE7E00"/>
+          </a:solidFill>
+          <a:prstDash val="solid"/>
+        </a:ln>
+        <a:effectLst>
+          <a:outerShdw blurRad="44450" dist="13970" dir="5400000" algn="ctr" rotWithShape="0">
+            <a:srgbClr val="000000">
+              <a:alpha val="45000"/>
+            </a:srgbClr>
+          </a:outerShdw>
+        </a:effectLst>
+        <a:scene3d>
+          <a:camera prst="orthographicFront">
+            <a:rot lat="0" lon="0" rev="0"/>
+          </a:camera>
+          <a:lightRig rig="twoPt" dir="tl"/>
+        </a:scene3d>
+        <a:sp3d prstMaterial="flat">
+          <a:bevelT w="12700" h="25400" prst="coolSlant"/>
+        </a:sp3d>
+      </dsp:spPr>
+      <dsp:style>
+        <a:lnRef idx="1">
+          <a:scrgbClr r="0" g="0" b="0"/>
+        </a:lnRef>
+        <a:fillRef idx="3">
+          <a:scrgbClr r="0" g="0" b="0"/>
+        </a:fillRef>
+        <a:effectRef idx="3">
+          <a:scrgbClr r="0" g="0" b="0"/>
+        </a:effectRef>
+        <a:fontRef idx="minor">
+          <a:schemeClr val="lt1"/>
+        </a:fontRef>
+      </dsp:style>
+    </dsp:sp>
+    <dsp:sp modelId="{BAC60C66-3959-42F4-AD9B-9C055940EE6C}">
+      <dsp:nvSpPr>
+        <dsp:cNvPr id="0" name=""/>
+        <dsp:cNvSpPr/>
+      </dsp:nvSpPr>
+      <dsp:spPr>
+        <a:xfrm>
+          <a:off x="3630393" y="1091702"/>
+          <a:ext cx="1096149" cy="1096063"/>
+        </a:xfrm>
+        <a:prstGeom prst="ellipse">
+          <a:avLst/>
+        </a:prstGeom>
+        <a:solidFill>
+          <a:schemeClr val="tx1"/>
+        </a:solidFill>
+        <a:ln>
+          <a:noFill/>
+        </a:ln>
+        <a:effectLst>
+          <a:outerShdw blurRad="44450" dist="13970" dir="5400000" algn="ctr" rotWithShape="0">
+            <a:srgbClr val="000000">
+              <a:alpha val="45000"/>
+            </a:srgbClr>
+          </a:outerShdw>
+        </a:effectLst>
+        <a:scene3d>
+          <a:camera prst="orthographicFront">
+            <a:rot lat="0" lon="0" rev="0"/>
+          </a:camera>
+          <a:lightRig rig="twoPt" dir="tl"/>
+        </a:scene3d>
+        <a:sp3d prstMaterial="flat">
+          <a:bevelT w="12700" h="25400" prst="coolSlant"/>
+        </a:sp3d>
+      </dsp:spPr>
+      <dsp:style>
+        <a:lnRef idx="0">
+          <a:scrgbClr r="0" g="0" b="0"/>
+        </a:lnRef>
+        <a:fillRef idx="1">
+          <a:scrgbClr r="0" g="0" b="0"/>
+        </a:fillRef>
+        <a:effectRef idx="3">
+          <a:scrgbClr r="0" g="0" b="0"/>
+        </a:effectRef>
+        <a:fontRef idx="minor"/>
+      </dsp:style>
+    </dsp:sp>
+    <dsp:sp modelId="{A58AFD8B-8B32-4F64-AAEE-3C1F0740AAD6}">
+      <dsp:nvSpPr>
+        <dsp:cNvPr id="0" name=""/>
+        <dsp:cNvSpPr/>
+      </dsp:nvSpPr>
+      <dsp:spPr>
+        <a:xfrm>
+          <a:off x="-2439" y="452437"/>
+          <a:ext cx="2804560" cy="2058934"/>
+        </a:xfrm>
+        <a:prstGeom prst="rect">
+          <a:avLst/>
+        </a:prstGeom>
+        <a:noFill/>
+        <a:ln>
+          <a:noFill/>
+        </a:ln>
+        <a:effectLst/>
+      </dsp:spPr>
+      <dsp:style>
+        <a:lnRef idx="0">
+          <a:scrgbClr r="0" g="0" b="0"/>
+        </a:lnRef>
+        <a:fillRef idx="0">
+          <a:scrgbClr r="0" g="0" b="0"/>
+        </a:fillRef>
+        <a:effectRef idx="0">
+          <a:scrgbClr r="0" g="0" b="0"/>
+        </a:effectRef>
+        <a:fontRef idx="minor"/>
+      </dsp:style>
+      <dsp:txBody>
+        <a:bodyPr spcFirstLastPara="0" vert="horz" wrap="square" lIns="35560" tIns="35560" rIns="35560" bIns="3556" numCol="1" spcCol="1270" anchor="ctr" anchorCtr="0">
+          <a:noAutofit/>
+        </a:bodyPr>
+        <a:lstStyle/>
+        <a:p>
+          <a:pPr lvl="0" algn="r" defTabSz="1244600">
+            <a:lnSpc>
+              <a:spcPct val="100000"/>
+            </a:lnSpc>
+            <a:spcBef>
+              <a:spcPct val="0"/>
+            </a:spcBef>
+            <a:spcAft>
+              <a:spcPct val="35000"/>
+            </a:spcAft>
+          </a:pPr>
+          <a:r>
+            <a:rPr lang="en-US" sz="2800" b="1" kern="1200" baseline="0" dirty="0" smtClean="0">
+              <a:solidFill>
+                <a:srgbClr val="FFF271"/>
+              </a:solidFill>
+            </a:rPr>
+            <a:t>Asynchronous</a:t>
+          </a:r>
+          <a:r>
+            <a:rPr lang="en-US" sz="1700" kern="1200" baseline="0" dirty="0" smtClean="0"/>
+            <a:t/>
+          </a:r>
+          <a:br>
+            <a:rPr lang="en-US" sz="1700" kern="1200" baseline="0" dirty="0" smtClean="0"/>
+          </a:br>
+          <a:r>
+            <a:rPr lang="en-US" sz="1700" kern="1200" baseline="0" dirty="0" smtClean="0">
+              <a:solidFill>
+                <a:schemeClr val="tx2"/>
+              </a:solidFill>
+            </a:rPr>
+            <a:t>Non-blocking, specifically in reference to I/O operations (not necessarily parallel, can be sequential</a:t>
+          </a:r>
+          <a:r>
+            <a:rPr lang="en-US" sz="1800" kern="1200" baseline="0" dirty="0" smtClean="0">
+              <a:solidFill>
+                <a:schemeClr val="tx2"/>
+              </a:solidFill>
+            </a:rPr>
+            <a:t>.)</a:t>
+          </a:r>
+          <a:endParaRPr lang="en-US" sz="1800" kern="1200" baseline="0" dirty="0">
+            <a:solidFill>
+              <a:schemeClr val="tx2"/>
+            </a:solidFill>
+          </a:endParaRPr>
+        </a:p>
+      </dsp:txBody>
+      <dsp:txXfrm>
+        <a:off x="-2439" y="452437"/>
+        <a:ext cx="2804560" cy="2058934"/>
+      </dsp:txXfrm>
+    </dsp:sp>
+    <dsp:sp modelId="{AB48E175-A7F5-436F-8320-91B87728B485}">
+      <dsp:nvSpPr>
+        <dsp:cNvPr id="0" name=""/>
+        <dsp:cNvSpPr/>
+      </dsp:nvSpPr>
+      <dsp:spPr>
+        <a:xfrm>
+          <a:off x="4263059" y="3241798"/>
+          <a:ext cx="3119274" cy="959141"/>
+        </a:xfrm>
+        <a:prstGeom prst="rect">
+          <a:avLst/>
+        </a:prstGeom>
+        <a:noFill/>
+        <a:ln>
+          <a:noFill/>
+        </a:ln>
+        <a:effectLst/>
+      </dsp:spPr>
+      <dsp:style>
+        <a:lnRef idx="0">
+          <a:scrgbClr r="0" g="0" b="0"/>
+        </a:lnRef>
+        <a:fillRef idx="0">
+          <a:scrgbClr r="0" g="0" b="0"/>
+        </a:fillRef>
+        <a:effectRef idx="0">
+          <a:scrgbClr r="0" g="0" b="0"/>
+        </a:effectRef>
+        <a:fontRef idx="minor"/>
+      </dsp:style>
+      <dsp:txBody>
+        <a:bodyPr spcFirstLastPara="0" vert="horz" wrap="square" lIns="35560" tIns="35560" rIns="35560" bIns="35560" numCol="1" spcCol="1270" anchor="ctr" anchorCtr="0">
+          <a:noAutofit/>
+        </a:bodyPr>
+        <a:lstStyle/>
+        <a:p>
+          <a:pPr lvl="0" algn="l" defTabSz="1244600">
+            <a:lnSpc>
+              <a:spcPct val="90000"/>
+            </a:lnSpc>
+            <a:spcBef>
+              <a:spcPct val="0"/>
+            </a:spcBef>
+            <a:spcAft>
+              <a:spcPct val="35000"/>
+            </a:spcAft>
+          </a:pPr>
+          <a:r>
+            <a:rPr lang="en-US" sz="2800" b="1" kern="1200" dirty="0" smtClean="0">
+              <a:solidFill>
+                <a:srgbClr val="FFF271"/>
+              </a:solidFill>
+            </a:rPr>
+            <a:t>Parallel</a:t>
+          </a:r>
+          <a:r>
+            <a:rPr lang="en-US" sz="2200" kern="1200" dirty="0" smtClean="0"/>
+            <a:t/>
+          </a:r>
+          <a:br>
+            <a:rPr lang="en-US" sz="2200" kern="1200" dirty="0" smtClean="0"/>
+          </a:br>
+          <a:r>
+            <a:rPr lang="en-US" sz="1800" kern="1200" dirty="0" smtClean="0">
+              <a:solidFill>
+                <a:schemeClr val="tx2"/>
+              </a:solidFill>
+            </a:rPr>
+            <a:t>Multiple operations processed simultaneously.</a:t>
+          </a:r>
+          <a:endParaRPr lang="en-US" sz="1800" kern="1200" dirty="0">
+            <a:solidFill>
+              <a:schemeClr val="tx2"/>
+            </a:solidFill>
+          </a:endParaRPr>
+        </a:p>
+      </dsp:txBody>
+      <dsp:txXfrm>
+        <a:off x="4263059" y="3241798"/>
+        <a:ext cx="3119274" cy="959141"/>
+      </dsp:txXfrm>
+    </dsp:sp>
+    <dsp:sp modelId="{79FE32CF-CBC2-4821-BC39-6EA057733777}">
+      <dsp:nvSpPr>
+        <dsp:cNvPr id="0" name=""/>
+        <dsp:cNvSpPr/>
+      </dsp:nvSpPr>
+      <dsp:spPr>
+        <a:xfrm>
+          <a:off x="4981490" y="873810"/>
+          <a:ext cx="2451957" cy="1526915"/>
+        </a:xfrm>
+        <a:prstGeom prst="rect">
+          <a:avLst/>
+        </a:prstGeom>
+        <a:noFill/>
+        <a:ln>
+          <a:noFill/>
+        </a:ln>
+        <a:effectLst/>
+      </dsp:spPr>
+      <dsp:style>
+        <a:lnRef idx="0">
+          <a:scrgbClr r="0" g="0" b="0"/>
+        </a:lnRef>
+        <a:fillRef idx="0">
+          <a:scrgbClr r="0" g="0" b="0"/>
+        </a:fillRef>
+        <a:effectRef idx="0">
+          <a:scrgbClr r="0" g="0" b="0"/>
+        </a:effectRef>
+        <a:fontRef idx="minor"/>
+      </dsp:style>
+      <dsp:txBody>
+        <a:bodyPr spcFirstLastPara="0" vert="horz" wrap="square" lIns="35560" tIns="35560" rIns="35560" bIns="35560" numCol="1" spcCol="1270" anchor="ctr" anchorCtr="0">
+          <a:noAutofit/>
+        </a:bodyPr>
+        <a:lstStyle/>
+        <a:p>
+          <a:pPr lvl="0" algn="l" defTabSz="1244600">
+            <a:lnSpc>
+              <a:spcPct val="90000"/>
+            </a:lnSpc>
+            <a:spcBef>
+              <a:spcPct val="0"/>
+            </a:spcBef>
+            <a:spcAft>
+              <a:spcPct val="35000"/>
+            </a:spcAft>
+          </a:pPr>
+          <a:r>
+            <a:rPr lang="en-US" sz="2800" b="1" kern="1200" dirty="0" smtClean="0">
+              <a:solidFill>
+                <a:srgbClr val="FFF271"/>
+              </a:solidFill>
+            </a:rPr>
+            <a:t>Concurrent</a:t>
+          </a:r>
+          <a:r>
+            <a:rPr lang="en-US" sz="1800" kern="1200" dirty="0" smtClean="0"/>
+            <a:t/>
+          </a:r>
+          <a:br>
+            <a:rPr lang="en-US" sz="1800" kern="1200" dirty="0" smtClean="0"/>
+          </a:br>
+          <a:r>
+            <a:rPr lang="en-US" sz="1800" kern="1200" dirty="0" smtClean="0">
+              <a:solidFill>
+                <a:schemeClr val="tx2"/>
+              </a:solidFill>
+            </a:rPr>
+            <a:t>Multiple operations happening at the same time (not necessarily in parallel).</a:t>
+          </a:r>
+          <a:endParaRPr lang="en-US" sz="1800" kern="1200" dirty="0">
+            <a:solidFill>
+              <a:schemeClr val="tx2"/>
+            </a:solidFill>
+          </a:endParaRPr>
+        </a:p>
+      </dsp:txBody>
+      <dsp:txXfrm>
+        <a:off x="4981490" y="873810"/>
+        <a:ext cx="2451957" cy="1526915"/>
+      </dsp:txXfrm>
+    </dsp:sp>
   </dsp:spTree>
 </dsp:drawing>
 </file>
@@ -7434,6 +10931,261 @@
       <dsp:cNvGrpSpPr/>
     </dsp:nvGrpSpPr>
     <dsp:grpSpPr/>
+    <dsp:sp modelId="{9CD17224-26FB-42BD-8E25-5AE899064F4E}">
+      <dsp:nvSpPr>
+        <dsp:cNvPr id="0" name=""/>
+        <dsp:cNvSpPr/>
+      </dsp:nvSpPr>
+      <dsp:spPr>
+        <a:xfrm>
+          <a:off x="3214" y="1155104"/>
+          <a:ext cx="2811065" cy="2811065"/>
+        </a:xfrm>
+        <a:prstGeom prst="ellipse">
+          <a:avLst/>
+        </a:prstGeom>
+        <a:solidFill>
+          <a:schemeClr val="accent2">
+            <a:alpha val="50000"/>
+            <a:hueOff val="0"/>
+            <a:satOff val="0"/>
+            <a:lumOff val="0"/>
+            <a:alphaOff val="0"/>
+          </a:schemeClr>
+        </a:solidFill>
+        <a:ln>
+          <a:noFill/>
+        </a:ln>
+        <a:effectLst/>
+        <a:scene3d>
+          <a:camera prst="orthographicFront">
+            <a:rot lat="0" lon="0" rev="0"/>
+          </a:camera>
+          <a:lightRig rig="contrasting" dir="t">
+            <a:rot lat="0" lon="0" rev="1200000"/>
+          </a:lightRig>
+        </a:scene3d>
+        <a:sp3d contourW="12700" prstMaterial="clear">
+          <a:bevelT w="177800" h="254000"/>
+          <a:bevelB w="152400"/>
+        </a:sp3d>
+      </dsp:spPr>
+      <dsp:style>
+        <a:lnRef idx="0">
+          <a:scrgbClr r="0" g="0" b="0"/>
+        </a:lnRef>
+        <a:fillRef idx="1">
+          <a:scrgbClr r="0" g="0" b="0"/>
+        </a:fillRef>
+        <a:effectRef idx="0">
+          <a:scrgbClr r="0" g="0" b="0"/>
+        </a:effectRef>
+        <a:fontRef idx="minor">
+          <a:schemeClr val="tx1"/>
+        </a:fontRef>
+      </dsp:style>
+      <dsp:txBody>
+        <a:bodyPr spcFirstLastPara="0" vert="horz" wrap="square" lIns="154702" tIns="29210" rIns="154702" bIns="29210" numCol="1" spcCol="1270" anchor="ctr" anchorCtr="0">
+          <a:noAutofit/>
+        </a:bodyPr>
+        <a:lstStyle/>
+        <a:p>
+          <a:pPr lvl="0" algn="ctr" defTabSz="1022350" rtl="0">
+            <a:lnSpc>
+              <a:spcPct val="90000"/>
+            </a:lnSpc>
+            <a:spcBef>
+              <a:spcPct val="0"/>
+            </a:spcBef>
+            <a:spcAft>
+              <a:spcPct val="35000"/>
+            </a:spcAft>
+          </a:pPr>
+          <a:r>
+            <a:rPr lang="en-US" sz="2300" kern="1200" dirty="0" smtClean="0">
+              <a:solidFill>
+                <a:schemeClr val="tx2"/>
+              </a:solidFill>
+            </a:rPr>
+            <a:t>F# agents are contained in-process; they are not distributed.</a:t>
+          </a:r>
+        </a:p>
+      </dsp:txBody>
+      <dsp:txXfrm>
+        <a:off x="414885" y="1566775"/>
+        <a:ext cx="1987723" cy="1987723"/>
+      </dsp:txXfrm>
+    </dsp:sp>
+    <dsp:sp modelId="{2D324642-AFED-4013-B227-A39ABB5D5BAA}">
+      <dsp:nvSpPr>
+        <dsp:cNvPr id="0" name=""/>
+        <dsp:cNvSpPr/>
+      </dsp:nvSpPr>
+      <dsp:spPr>
+        <a:xfrm>
+          <a:off x="2252067" y="1155104"/>
+          <a:ext cx="2811065" cy="2811065"/>
+        </a:xfrm>
+        <a:prstGeom prst="ellipse">
+          <a:avLst/>
+        </a:prstGeom>
+        <a:solidFill>
+          <a:schemeClr val="accent2">
+            <a:alpha val="50000"/>
+            <a:hueOff val="0"/>
+            <a:satOff val="0"/>
+            <a:lumOff val="0"/>
+            <a:alphaOff val="0"/>
+          </a:schemeClr>
+        </a:solidFill>
+        <a:ln>
+          <a:noFill/>
+        </a:ln>
+        <a:effectLst/>
+        <a:scene3d>
+          <a:camera prst="orthographicFront">
+            <a:rot lat="0" lon="0" rev="0"/>
+          </a:camera>
+          <a:lightRig rig="contrasting" dir="t">
+            <a:rot lat="0" lon="0" rev="1200000"/>
+          </a:lightRig>
+        </a:scene3d>
+        <a:sp3d contourW="12700" prstMaterial="clear">
+          <a:bevelT w="177800" h="254000"/>
+          <a:bevelB w="152400"/>
+        </a:sp3d>
+      </dsp:spPr>
+      <dsp:style>
+        <a:lnRef idx="0">
+          <a:scrgbClr r="0" g="0" b="0"/>
+        </a:lnRef>
+        <a:fillRef idx="1">
+          <a:scrgbClr r="0" g="0" b="0"/>
+        </a:fillRef>
+        <a:effectRef idx="0">
+          <a:scrgbClr r="0" g="0" b="0"/>
+        </a:effectRef>
+        <a:fontRef idx="minor">
+          <a:schemeClr val="tx1"/>
+        </a:fontRef>
+      </dsp:style>
+      <dsp:txBody>
+        <a:bodyPr spcFirstLastPara="0" vert="horz" wrap="square" lIns="154702" tIns="29210" rIns="154702" bIns="29210" numCol="1" spcCol="1270" anchor="ctr" anchorCtr="0">
+          <a:noAutofit/>
+        </a:bodyPr>
+        <a:lstStyle/>
+        <a:p>
+          <a:pPr lvl="0" algn="ctr" defTabSz="1022350">
+            <a:lnSpc>
+              <a:spcPct val="90000"/>
+            </a:lnSpc>
+            <a:spcBef>
+              <a:spcPct val="0"/>
+            </a:spcBef>
+            <a:spcAft>
+              <a:spcPct val="35000"/>
+            </a:spcAft>
+          </a:pPr>
+          <a:r>
+            <a:rPr lang="en-US" sz="2300" kern="1200" dirty="0" smtClean="0">
+              <a:solidFill>
+                <a:schemeClr val="tx2"/>
+              </a:solidFill>
+            </a:rPr>
+            <a:t>Lack of support for supervisors.</a:t>
+          </a:r>
+        </a:p>
+      </dsp:txBody>
+      <dsp:txXfrm>
+        <a:off x="2663738" y="1566775"/>
+        <a:ext cx="1987723" cy="1987723"/>
+      </dsp:txXfrm>
+    </dsp:sp>
+    <dsp:sp modelId="{10269018-D26A-4153-BF03-D986974ABBFB}">
+      <dsp:nvSpPr>
+        <dsp:cNvPr id="0" name=""/>
+        <dsp:cNvSpPr/>
+      </dsp:nvSpPr>
+      <dsp:spPr>
+        <a:xfrm>
+          <a:off x="4500919" y="1155104"/>
+          <a:ext cx="2811065" cy="2811065"/>
+        </a:xfrm>
+        <a:prstGeom prst="ellipse">
+          <a:avLst/>
+        </a:prstGeom>
+        <a:solidFill>
+          <a:schemeClr val="accent2">
+            <a:alpha val="50000"/>
+            <a:hueOff val="0"/>
+            <a:satOff val="0"/>
+            <a:lumOff val="0"/>
+            <a:alphaOff val="0"/>
+          </a:schemeClr>
+        </a:solidFill>
+        <a:ln>
+          <a:noFill/>
+        </a:ln>
+        <a:effectLst/>
+        <a:scene3d>
+          <a:camera prst="orthographicFront">
+            <a:rot lat="0" lon="0" rev="0"/>
+          </a:camera>
+          <a:lightRig rig="contrasting" dir="t">
+            <a:rot lat="0" lon="0" rev="1200000"/>
+          </a:lightRig>
+        </a:scene3d>
+        <a:sp3d contourW="12700" prstMaterial="clear">
+          <a:bevelT w="177800" h="254000"/>
+          <a:bevelB w="152400"/>
+        </a:sp3d>
+      </dsp:spPr>
+      <dsp:style>
+        <a:lnRef idx="0">
+          <a:scrgbClr r="0" g="0" b="0"/>
+        </a:lnRef>
+        <a:fillRef idx="1">
+          <a:scrgbClr r="0" g="0" b="0"/>
+        </a:fillRef>
+        <a:effectRef idx="0">
+          <a:scrgbClr r="0" g="0" b="0"/>
+        </a:effectRef>
+        <a:fontRef idx="minor">
+          <a:schemeClr val="tx1"/>
+        </a:fontRef>
+      </dsp:style>
+      <dsp:txBody>
+        <a:bodyPr spcFirstLastPara="0" vert="horz" wrap="square" lIns="154702" tIns="29210" rIns="154702" bIns="29210" numCol="1" spcCol="1270" anchor="ctr" anchorCtr="0">
+          <a:noAutofit/>
+        </a:bodyPr>
+        <a:lstStyle/>
+        <a:p>
+          <a:pPr lvl="0" algn="ctr" defTabSz="1022350">
+            <a:lnSpc>
+              <a:spcPct val="90000"/>
+            </a:lnSpc>
+            <a:spcBef>
+              <a:spcPct val="0"/>
+            </a:spcBef>
+            <a:spcAft>
+              <a:spcPct val="35000"/>
+            </a:spcAft>
+          </a:pPr>
+          <a:r>
+            <a:rPr lang="en-US" sz="2300" kern="1200" dirty="0" smtClean="0">
+              <a:solidFill>
+                <a:schemeClr val="tx2"/>
+              </a:solidFill>
+            </a:rPr>
+            <a:t>No built-in durable mailboxes.</a:t>
+          </a:r>
+        </a:p>
+      </dsp:txBody>
+      <dsp:txXfrm>
+        <a:off x="4912590" y="1566775"/>
+        <a:ext cx="1987723" cy="1987723"/>
+      </dsp:txXfrm>
+    </dsp:sp>
   </dsp:spTree>
 </dsp:drawing>
 </file>
@@ -20636,7 +24388,7 @@
           <a:p>
             <a:fld id="{F5FDDA56-26A9-45CA-92DB-3ECDF3E07D23}" type="datetimeFigureOut">
               <a:rPr lang="en-US" smtClean="0"/>
-              <a:t>1/10/2014</a:t>
+              <a:t>9/20/14</a:t>
             </a:fld>
             <a:endParaRPr lang="en-US"/>
           </a:p>
@@ -21564,7 +25316,7 @@
           <a:p>
             <a:fld id="{439E3D42-BC8C-48A8-BF09-B3D1FCE3ADA9}" type="datetime1">
               <a:rPr lang="en-US" smtClean="0"/>
-              <a:t>1/10/2014</a:t>
+              <a:t>9/20/14</a:t>
             </a:fld>
             <a:endParaRPr lang="en-US" dirty="0"/>
           </a:p>
@@ -21630,7 +25382,7 @@
   </p:clrMapOvr>
   <p:extLst mod="1">
     <p:ext uri="{DCECCB84-F9BA-43D5-87BE-67443E8EF086}">
-      <p15:sldGuideLst xmlns:p15="http://schemas.microsoft.com/office/powerpoint/2012/main"/>
+      <p15:sldGuideLst xmlns:p15="http://schemas.microsoft.com/office/powerpoint/2012/main" xmlns=""/>
     </p:ext>
   </p:extLst>
 </p:sldLayout>
@@ -21745,7 +25497,7 @@
           <a:p>
             <a:fld id="{C7B3822C-3B36-4EBF-A73B-1429053F4584}" type="datetime1">
               <a:rPr lang="en-US" smtClean="0"/>
-              <a:t>1/10/2014</a:t>
+              <a:t>9/20/14</a:t>
             </a:fld>
             <a:endParaRPr lang="en-US" dirty="0"/>
           </a:p>
@@ -21931,7 +25683,7 @@
           <a:p>
             <a:fld id="{BDE63735-5068-4E72-9C4B-8A5DD0228D73}" type="datetime1">
               <a:rPr lang="en-US" smtClean="0"/>
-              <a:t>1/10/2014</a:t>
+              <a:t>9/20/14</a:t>
             </a:fld>
             <a:endParaRPr lang="en-US" dirty="0"/>
           </a:p>
@@ -22137,7 +25889,7 @@
           <a:p>
             <a:fld id="{3F11D752-DC77-4AD0-9BD5-303C80E18703}" type="datetime1">
               <a:rPr lang="en-US" smtClean="0"/>
-              <a:t>1/10/2014</a:t>
+              <a:t>9/20/14</a:t>
             </a:fld>
             <a:endParaRPr lang="en-US" dirty="0"/>
           </a:p>
@@ -22277,7 +26029,7 @@
           <a:p>
             <a:fld id="{26FD9272-1AB9-4EE3-946C-51DACA81BCAE}" type="datetime1">
               <a:rPr lang="en-US" smtClean="0"/>
-              <a:t>1/10/2014</a:t>
+              <a:t>9/20/14</a:t>
             </a:fld>
             <a:endParaRPr lang="en-US" dirty="0"/>
           </a:p>
@@ -22344,13 +26096,13 @@
   <p:timing>
     <p:tnLst>
       <p:par>
-        <p:cTn id="1" dur="indefinite" restart="never" nodeType="tmRoot"/>
+        <p:cTn xmlns:p14="http://schemas.microsoft.com/office/powerpoint/2010/main" id="1" dur="indefinite" restart="never" nodeType="tmRoot"/>
       </p:par>
     </p:tnLst>
   </p:timing>
   <p:extLst mod="1">
     <p:ext uri="{DCECCB84-F9BA-43D5-87BE-67443E8EF086}">
-      <p15:sldGuideLst xmlns:p15="http://schemas.microsoft.com/office/powerpoint/2012/main"/>
+      <p15:sldGuideLst xmlns:p15="http://schemas.microsoft.com/office/powerpoint/2012/main" xmlns=""/>
     </p:ext>
   </p:extLst>
 </p:sldLayout>
@@ -22429,7 +26181,7 @@
           <a:p>
             <a:fld id="{26FD9272-1AB9-4EE3-946C-51DACA81BCAE}" type="datetime1">
               <a:rPr lang="en-US" smtClean="0"/>
-              <a:t>1/10/2014</a:t>
+              <a:t>9/20/14</a:t>
             </a:fld>
             <a:endParaRPr lang="en-US" dirty="0"/>
           </a:p>
@@ -22496,13 +26248,13 @@
   <p:timing>
     <p:tnLst>
       <p:par>
-        <p:cTn id="1" dur="indefinite" restart="never" nodeType="tmRoot"/>
+        <p:cTn xmlns:p14="http://schemas.microsoft.com/office/powerpoint/2010/main" id="1" dur="indefinite" restart="never" nodeType="tmRoot"/>
       </p:par>
     </p:tnLst>
   </p:timing>
   <p:extLst mod="1">
     <p:ext uri="{DCECCB84-F9BA-43D5-87BE-67443E8EF086}">
-      <p15:sldGuideLst xmlns:p15="http://schemas.microsoft.com/office/powerpoint/2012/main"/>
+      <p15:sldGuideLst xmlns:p15="http://schemas.microsoft.com/office/powerpoint/2012/main" xmlns=""/>
     </p:ext>
   </p:extLst>
 </p:sldLayout>
@@ -22696,7 +26448,7 @@
                 </a:solidFill>
               </a:rPr>
               <a:pPr/>
-              <a:t>1/10/2014</a:t>
+              <a:t>9/20/14</a:t>
             </a:fld>
             <a:endParaRPr lang="en-US">
               <a:solidFill>
@@ -22898,7 +26650,7 @@
                 </a:solidFill>
               </a:rPr>
               <a:pPr/>
-              <a:t>1/10/2014</a:t>
+              <a:t>9/20/14</a:t>
             </a:fld>
             <a:endParaRPr lang="en-US">
               <a:solidFill>
@@ -23176,7 +26928,7 @@
                 </a:solidFill>
               </a:rPr>
               <a:pPr/>
-              <a:t>1/10/2014</a:t>
+              <a:t>9/20/14</a:t>
             </a:fld>
             <a:endParaRPr lang="en-US">
               <a:solidFill>
@@ -23496,7 +27248,7 @@
                 </a:solidFill>
               </a:rPr>
               <a:pPr/>
-              <a:t>1/10/2014</a:t>
+              <a:t>9/20/14</a:t>
             </a:fld>
             <a:endParaRPr lang="en-US">
               <a:solidFill>
@@ -23950,7 +27702,7 @@
                 </a:solidFill>
               </a:rPr>
               <a:pPr/>
-              <a:t>1/10/2014</a:t>
+              <a:t>9/20/14</a:t>
             </a:fld>
             <a:endParaRPr lang="en-US">
               <a:solidFill>
@@ -24145,7 +27897,7 @@
           <a:p>
             <a:fld id="{329A7BC1-9504-4855-B5DD-B2E60C013FF1}" type="datetime1">
               <a:rPr lang="en-US" smtClean="0"/>
-              <a:t>1/10/2014</a:t>
+              <a:t>9/20/14</a:t>
             </a:fld>
             <a:endParaRPr lang="en-US" dirty="0"/>
           </a:p>
@@ -24275,7 +28027,7 @@
                 </a:solidFill>
               </a:rPr>
               <a:pPr/>
-              <a:t>1/10/2014</a:t>
+              <a:t>9/20/14</a:t>
             </a:fld>
             <a:endParaRPr lang="en-US">
               <a:solidFill>
@@ -24402,7 +28154,7 @@
                 </a:solidFill>
               </a:rPr>
               <a:pPr/>
-              <a:t>1/10/2014</a:t>
+              <a:t>9/20/14</a:t>
             </a:fld>
             <a:endParaRPr lang="en-US">
               <a:solidFill>
@@ -24711,7 +28463,7 @@
                 </a:solidFill>
               </a:rPr>
               <a:pPr/>
-              <a:t>1/10/2014</a:t>
+              <a:t>9/20/14</a:t>
             </a:fld>
             <a:endParaRPr lang="en-US">
               <a:solidFill>
@@ -24996,7 +28748,7 @@
                 </a:solidFill>
               </a:rPr>
               <a:pPr/>
-              <a:t>1/10/2014</a:t>
+              <a:t>9/20/14</a:t>
             </a:fld>
             <a:endParaRPr lang="en-US">
               <a:solidFill>
@@ -25198,7 +28950,7 @@
                 </a:solidFill>
               </a:rPr>
               <a:pPr/>
-              <a:t>1/10/2014</a:t>
+              <a:t>9/20/14</a:t>
             </a:fld>
             <a:endParaRPr lang="en-US">
               <a:solidFill>
@@ -25410,7 +29162,7 @@
                 </a:solidFill>
               </a:rPr>
               <a:pPr/>
-              <a:t>1/10/2014</a:t>
+              <a:t>9/20/14</a:t>
             </a:fld>
             <a:endParaRPr lang="en-US">
               <a:solidFill>
@@ -25687,7 +29439,7 @@
           <a:p>
             <a:fld id="{38FB8DDE-8774-4EDF-982C-F60E644380EF}" type="datetime1">
               <a:rPr lang="en-US" smtClean="0"/>
-              <a:t>1/10/2014</a:t>
+              <a:t>9/20/14</a:t>
             </a:fld>
             <a:endParaRPr lang="en-US" dirty="0"/>
           </a:p>
@@ -25982,7 +29734,7 @@
           <a:p>
             <a:fld id="{01597155-45E7-42C0-86F4-39AC64CFCD51}" type="datetime1">
               <a:rPr lang="en-US" smtClean="0"/>
-              <a:t>1/10/2014</a:t>
+              <a:t>9/20/14</a:t>
             </a:fld>
             <a:endParaRPr lang="en-US" dirty="0"/>
           </a:p>
@@ -26047,7 +29799,7 @@
   </p:clrMapOvr>
   <p:extLst mod="1">
     <p:ext uri="{DCECCB84-F9BA-43D5-87BE-67443E8EF086}">
-      <p15:sldGuideLst xmlns:p15="http://schemas.microsoft.com/office/powerpoint/2012/main"/>
+      <p15:sldGuideLst xmlns:p15="http://schemas.microsoft.com/office/powerpoint/2012/main" xmlns=""/>
     </p:ext>
   </p:extLst>
 </p:sldLayout>
@@ -26428,7 +30180,7 @@
           <a:p>
             <a:fld id="{8CEC1F47-F9B1-41B4-9B15-B98939EFF635}" type="datetime1">
               <a:rPr lang="en-US" smtClean="0"/>
-              <a:t>1/10/2014</a:t>
+              <a:t>9/20/14</a:t>
             </a:fld>
             <a:endParaRPr lang="en-US" dirty="0"/>
           </a:p>
@@ -26493,7 +30245,7 @@
   </p:clrMapOvr>
   <p:extLst mod="1">
     <p:ext uri="{DCECCB84-F9BA-43D5-87BE-67443E8EF086}">
-      <p15:sldGuideLst xmlns:p15="http://schemas.microsoft.com/office/powerpoint/2012/main"/>
+      <p15:sldGuideLst xmlns:p15="http://schemas.microsoft.com/office/powerpoint/2012/main" xmlns=""/>
     </p:ext>
   </p:extLst>
 </p:sldLayout>
@@ -26556,7 +30308,7 @@
           <a:p>
             <a:fld id="{5E6F84F0-D8E9-4591-BE6B-E851B07340B4}" type="datetime1">
               <a:rPr lang="en-US" smtClean="0"/>
-              <a:t>1/10/2014</a:t>
+              <a:t>9/20/14</a:t>
             </a:fld>
             <a:endParaRPr lang="en-US" dirty="0"/>
           </a:p>
@@ -26656,7 +30408,7 @@
           <a:p>
             <a:fld id="{9E65F527-2001-4F5D-9D3A-61A918BE82E9}" type="datetime1">
               <a:rPr lang="en-US" smtClean="0"/>
-              <a:t>1/10/2014</a:t>
+              <a:t>9/20/14</a:t>
             </a:fld>
             <a:endParaRPr lang="en-US" dirty="0"/>
           </a:p>
@@ -26949,7 +30701,7 @@
           <a:p>
             <a:fld id="{B5EAD28E-5D03-407D-8E1E-6055258D1A20}" type="datetime1">
               <a:rPr lang="en-US" smtClean="0"/>
-              <a:t>1/10/2014</a:t>
+              <a:t>9/20/14</a:t>
             </a:fld>
             <a:endParaRPr lang="en-US" dirty="0"/>
           </a:p>
@@ -27015,7 +30767,7 @@
   </p:clrMapOvr>
   <p:extLst mod="1">
     <p:ext uri="{DCECCB84-F9BA-43D5-87BE-67443E8EF086}">
-      <p15:sldGuideLst xmlns:p15="http://schemas.microsoft.com/office/powerpoint/2012/main"/>
+      <p15:sldGuideLst xmlns:p15="http://schemas.microsoft.com/office/powerpoint/2012/main" xmlns=""/>
     </p:ext>
   </p:extLst>
 </p:sldLayout>
@@ -27234,7 +30986,7 @@
           <a:p>
             <a:fld id="{38FB8DDE-8774-4EDF-982C-F60E644380EF}" type="datetime1">
               <a:rPr lang="en-US" smtClean="0"/>
-              <a:t>1/10/2014</a:t>
+              <a:t>9/20/14</a:t>
             </a:fld>
             <a:endParaRPr lang="en-US" dirty="0"/>
           </a:p>
@@ -27543,7 +31295,7 @@
           <a:p>
             <a:fld id="{38FB8DDE-8774-4EDF-982C-F60E644380EF}" type="datetime1">
               <a:rPr lang="en-US" smtClean="0"/>
-              <a:t>1/10/2014</a:t>
+              <a:t>9/20/14</a:t>
             </a:fld>
             <a:endParaRPr lang="en-US" dirty="0"/>
           </a:p>
@@ -28029,7 +31781,7 @@
   </p:txStyles>
   <p:extLst mod="1">
     <p:ext uri="{27BBF7A9-308A-43DC-89C8-2F10F3537804}">
-      <p15:sldGuideLst xmlns:p15="http://schemas.microsoft.com/office/powerpoint/2012/main"/>
+      <p15:sldGuideLst xmlns:p15="http://schemas.microsoft.com/office/powerpoint/2012/main" xmlns=""/>
     </p:ext>
   </p:extLst>
 </p:sldMaster>
@@ -28197,7 +31949,7 @@
                 </a:solidFill>
               </a:rPr>
               <a:pPr/>
-              <a:t>1/10/2014</a:t>
+              <a:t>9/20/14</a:t>
             </a:fld>
             <a:endParaRPr lang="en-US">
               <a:solidFill>
@@ -29275,14 +33027,14 @@
           <a:effectLst/>
           <a:extLst>
             <a:ext uri="{909E8E84-426E-40dd-AFC4-6F175D3DCCD1}">
-              <a14:hiddenFill xmlns:a14="http://schemas.microsoft.com/office/drawing/2010/main" xmlns="">
+              <a14:hiddenFill xmlns:a14="http://schemas.microsoft.com/office/drawing/2010/main">
                 <a:solidFill>
                   <a:schemeClr val="accent1"/>
                 </a:solidFill>
               </a14:hiddenFill>
             </a:ext>
             <a:ext uri="{91240B29-F687-4f45-9708-019B960494DF}">
-              <a14:hiddenLine xmlns:a14="http://schemas.microsoft.com/office/drawing/2010/main" xmlns="" w="9525">
+              <a14:hiddenLine xmlns:a14="http://schemas.microsoft.com/office/drawing/2010/main" w="9525">
                 <a:solidFill>
                   <a:schemeClr val="tx1"/>
                 </a:solidFill>
@@ -29292,7 +33044,7 @@
               </a14:hiddenLine>
             </a:ext>
             <a:ext uri="{AF507438-7753-43e0-B8FC-AC1667EBCBE1}">
-              <a14:hiddenEffects xmlns:a14="http://schemas.microsoft.com/office/drawing/2010/main" xmlns="">
+              <a14:hiddenEffects xmlns:a14="http://schemas.microsoft.com/office/drawing/2010/main">
                 <a:effectLst>
                   <a:outerShdw dist="35921" dir="2700000" algn="ctr" rotWithShape="0">
                     <a:schemeClr val="bg2"/>
@@ -29335,7 +33087,7 @@
           <a:noFill/>
           <a:extLst>
             <a:ext uri="{909E8E84-426E-40dd-AFC4-6F175D3DCCD1}">
-              <a14:hiddenFill xmlns:a14="http://schemas.microsoft.com/office/drawing/2010/main" xmlns="">
+              <a14:hiddenFill xmlns:a14="http://schemas.microsoft.com/office/drawing/2010/main">
                 <a:solidFill>
                   <a:srgbClr val="FFFFFF"/>
                 </a:solidFill>
@@ -29373,11 +33125,7 @@
             </a:r>
             <a:r>
               <a:rPr lang="en-US" sz="5400" b="1" smtClean="0"/>
-              <a:t># </a:t>
-            </a:r>
-            <a:r>
-              <a:rPr lang="en-US" sz="5400" b="1" smtClean="0"/>
-              <a:t>Agents</a:t>
+              <a:t># Agents</a:t>
             </a:r>
             <a:endParaRPr lang="en-US" sz="3200" b="1" dirty="0"/>
           </a:p>
@@ -29426,7 +33174,7 @@
   <p:timing>
     <p:tnLst>
       <p:par>
-        <p:cTn id="1" dur="indefinite" restart="never" nodeType="tmRoot"/>
+        <p:cTn xmlns:p14="http://schemas.microsoft.com/office/powerpoint/2010/main" id="1" dur="indefinite" restart="never" nodeType="tmRoot"/>
       </p:par>
     </p:tnLst>
   </p:timing>
@@ -29537,7 +33285,7 @@
   <p:timing>
     <p:tnLst>
       <p:par>
-        <p:cTn id="1" dur="indefinite" restart="never" nodeType="tmRoot"/>
+        <p:cTn xmlns:p14="http://schemas.microsoft.com/office/powerpoint/2010/main" id="1" dur="indefinite" restart="never" nodeType="tmRoot"/>
       </p:par>
     </p:tnLst>
   </p:timing>
@@ -29649,7 +33397,7 @@
   <p:timing>
     <p:tnLst>
       <p:par>
-        <p:cTn id="1" dur="indefinite" restart="never" nodeType="tmRoot"/>
+        <p:cTn xmlns:p14="http://schemas.microsoft.com/office/powerpoint/2010/main" id="1" dur="indefinite" restart="never" nodeType="tmRoot"/>
       </p:par>
     </p:tnLst>
   </p:timing>
@@ -29734,7 +33482,7 @@
   <p:timing>
     <p:tnLst>
       <p:par>
-        <p:cTn id="1" dur="indefinite" restart="never" nodeType="tmRoot"/>
+        <p:cTn xmlns:p14="http://schemas.microsoft.com/office/powerpoint/2010/main" id="1" dur="indefinite" restart="never" nodeType="tmRoot"/>
       </p:par>
     </p:tnLst>
   </p:timing>
@@ -29924,7 +33672,7 @@
   <p:timing>
     <p:tnLst>
       <p:par>
-        <p:cTn id="1" dur="indefinite" restart="never" nodeType="tmRoot"/>
+        <p:cTn xmlns:p14="http://schemas.microsoft.com/office/powerpoint/2010/main" id="1" dur="indefinite" restart="never" nodeType="tmRoot"/>
       </p:par>
     </p:tnLst>
   </p:timing>
@@ -30009,7 +33757,7 @@
   <p:timing>
     <p:tnLst>
       <p:par>
-        <p:cTn id="1" dur="indefinite" restart="never" nodeType="tmRoot">
+        <p:cTn xmlns:p14="http://schemas.microsoft.com/office/powerpoint/2010/main" id="1" dur="indefinite" restart="never" nodeType="tmRoot">
           <p:childTnLst>
             <p:seq concurrent="1" nextAc="seek">
               <p:cTn id="2" dur="indefinite" nodeType="mainSeq">
@@ -30532,7 +34280,7 @@
   <p:timing>
     <p:tnLst>
       <p:par>
-        <p:cTn id="1" dur="indefinite" restart="never" nodeType="tmRoot"/>
+        <p:cTn xmlns:p14="http://schemas.microsoft.com/office/powerpoint/2010/main" id="1" dur="indefinite" restart="never" nodeType="tmRoot"/>
       </p:par>
     </p:tnLst>
   </p:timing>
@@ -30617,7 +34365,7 @@
   <p:timing>
     <p:tnLst>
       <p:par>
-        <p:cTn id="1" dur="indefinite" restart="never" nodeType="tmRoot">
+        <p:cTn xmlns:p14="http://schemas.microsoft.com/office/powerpoint/2010/main" id="1" dur="indefinite" restart="never" nodeType="tmRoot">
           <p:childTnLst>
             <p:seq concurrent="1" nextAc="seek">
               <p:cTn id="2" dur="indefinite" nodeType="mainSeq">
@@ -30867,7 +34615,7 @@
   <p:timing>
     <p:tnLst>
       <p:par>
-        <p:cTn id="1" dur="indefinite" restart="never" nodeType="tmRoot"/>
+        <p:cTn xmlns:p14="http://schemas.microsoft.com/office/powerpoint/2010/main" id="1" dur="indefinite" restart="never" nodeType="tmRoot"/>
       </p:par>
     </p:tnLst>
   </p:timing>
@@ -31261,7 +35009,7 @@
   <p:timing>
     <p:tnLst>
       <p:par>
-        <p:cTn id="1" dur="indefinite" restart="never" nodeType="tmRoot"/>
+        <p:cTn xmlns:p14="http://schemas.microsoft.com/office/powerpoint/2010/main" id="1" dur="indefinite" restart="never" nodeType="tmRoot"/>
       </p:par>
     </p:tnLst>
   </p:timing>
@@ -31428,14 +35176,14 @@
           <a:effectLst/>
           <a:extLst>
             <a:ext uri="{909E8E84-426E-40dd-AFC4-6F175D3DCCD1}">
-              <a14:hiddenFill xmlns:a14="http://schemas.microsoft.com/office/drawing/2010/main" xmlns="">
+              <a14:hiddenFill xmlns:a14="http://schemas.microsoft.com/office/drawing/2010/main">
                 <a:solidFill>
                   <a:schemeClr val="accent1"/>
                 </a:solidFill>
               </a14:hiddenFill>
             </a:ext>
             <a:ext uri="{91240B29-F687-4f45-9708-019B960494DF}">
-              <a14:hiddenLine xmlns:a14="http://schemas.microsoft.com/office/drawing/2010/main" xmlns="" w="9525">
+              <a14:hiddenLine xmlns:a14="http://schemas.microsoft.com/office/drawing/2010/main" w="9525">
                 <a:solidFill>
                   <a:schemeClr val="tx1"/>
                 </a:solidFill>
@@ -31445,7 +35193,7 @@
               </a14:hiddenLine>
             </a:ext>
             <a:ext uri="{AF507438-7753-43e0-B8FC-AC1667EBCBE1}">
-              <a14:hiddenEffects xmlns:a14="http://schemas.microsoft.com/office/drawing/2010/main" xmlns="">
+              <a14:hiddenEffects xmlns:a14="http://schemas.microsoft.com/office/drawing/2010/main">
                 <a:effectLst>
                   <a:outerShdw dist="35921" dir="2700000" algn="ctr" rotWithShape="0">
                     <a:schemeClr val="bg2"/>
@@ -31577,7 +35325,7 @@
   <p:timing>
     <p:tnLst>
       <p:par>
-        <p:cTn id="1" dur="indefinite" restart="never" nodeType="tmRoot"/>
+        <p:cTn xmlns:p14="http://schemas.microsoft.com/office/powerpoint/2010/main" id="1" dur="indefinite" restart="never" nodeType="tmRoot"/>
       </p:par>
     </p:tnLst>
   </p:timing>
@@ -31767,7 +35515,7 @@
   <p:timing>
     <p:tnLst>
       <p:par>
-        <p:cTn id="1" dur="indefinite" restart="never" nodeType="tmRoot"/>
+        <p:cTn xmlns:p14="http://schemas.microsoft.com/office/powerpoint/2010/main" id="1" dur="indefinite" restart="never" nodeType="tmRoot"/>
       </p:par>
     </p:tnLst>
   </p:timing>
@@ -32003,7 +35751,7 @@
   <p:timing>
     <p:tnLst>
       <p:par>
-        <p:cTn id="1" dur="indefinite" restart="never" nodeType="tmRoot"/>
+        <p:cTn xmlns:p14="http://schemas.microsoft.com/office/powerpoint/2010/main" id="1" dur="indefinite" restart="never" nodeType="tmRoot"/>
       </p:par>
     </p:tnLst>
   </p:timing>
@@ -32088,7 +35836,7 @@
   <p:timing>
     <p:tnLst>
       <p:par>
-        <p:cTn id="1" dur="indefinite" restart="never" nodeType="tmRoot"/>
+        <p:cTn xmlns:p14="http://schemas.microsoft.com/office/powerpoint/2010/main" id="1" dur="indefinite" restart="never" nodeType="tmRoot"/>
       </p:par>
     </p:tnLst>
   </p:timing>
@@ -32292,7 +36040,7 @@
   <p:timing>
     <p:tnLst>
       <p:par>
-        <p:cTn id="1" dur="indefinite" restart="never" nodeType="tmRoot">
+        <p:cTn xmlns:p14="http://schemas.microsoft.com/office/powerpoint/2010/main" id="1" dur="indefinite" restart="never" nodeType="tmRoot">
           <p:childTnLst>
             <p:seq concurrent="1" nextAc="seek">
               <p:cTn id="2" dur="indefinite" nodeType="mainSeq">
@@ -32496,7 +36244,7 @@
   <p:timing>
     <p:tnLst>
       <p:par>
-        <p:cTn id="1" dur="indefinite" restart="never" nodeType="tmRoot"/>
+        <p:cTn xmlns:p14="http://schemas.microsoft.com/office/powerpoint/2010/main" id="1" dur="indefinite" restart="never" nodeType="tmRoot"/>
       </p:par>
     </p:tnLst>
   </p:timing>
@@ -32610,7 +36358,7 @@
   <p:timing>
     <p:tnLst>
       <p:par>
-        <p:cTn id="1" dur="indefinite" restart="never" nodeType="tmRoot"/>
+        <p:cTn xmlns:p14="http://schemas.microsoft.com/office/powerpoint/2010/main" id="1" dur="indefinite" restart="never" nodeType="tmRoot"/>
       </p:par>
     </p:tnLst>
   </p:timing>
@@ -32750,7 +36498,7 @@
   <p:timing>
     <p:tnLst>
       <p:par>
-        <p:cTn id="1" dur="indefinite" restart="never" nodeType="tmRoot"/>
+        <p:cTn xmlns:p14="http://schemas.microsoft.com/office/powerpoint/2010/main" id="1" dur="indefinite" restart="never" nodeType="tmRoot"/>
       </p:par>
     </p:tnLst>
   </p:timing>
@@ -32862,7 +36610,7 @@
   <p:timing>
     <p:tnLst>
       <p:par>
-        <p:cTn id="1" dur="indefinite" restart="never" nodeType="tmRoot"/>
+        <p:cTn xmlns:p14="http://schemas.microsoft.com/office/powerpoint/2010/main" id="1" dur="indefinite" restart="never" nodeType="tmRoot"/>
       </p:par>
     </p:tnLst>
   </p:timing>
@@ -32912,7 +36660,7 @@
     </a:clrScheme>
     <a:fontScheme name="Frame">
       <a:majorFont>
-        <a:latin typeface="Corbel" panose="020B0503020204020204"/>
+        <a:latin typeface="Corbel"/>
         <a:ea typeface=""/>
         <a:cs typeface=""/>
         <a:font script="Jpan" typeface="ＭＳ ゴシック"/>
@@ -32947,7 +36695,7 @@
         <a:font script="Geor" typeface="Sylfaen"/>
       </a:majorFont>
       <a:minorFont>
-        <a:latin typeface="Corbel" panose="020B0503020204020204"/>
+        <a:latin typeface="Corbel"/>
         <a:ea typeface=""/>
         <a:cs typeface=""/>
         <a:font script="Jpan" typeface="ＭＳ ゴシック"/>
@@ -33094,7 +36842,7 @@
   <a:extraClrSchemeLst/>
   <a:extLst>
     <a:ext uri="{05A4C25C-085E-4340-85A3-A5531E510DB2}">
-      <thm15:themeFamily xmlns:thm15="http://schemas.microsoft.com/office/thememl/2012/main" name="Frame" id="{F226E7A2-7162-461C-9490-D27D9DC04E43}" vid="{9935E573-C197-41A8-BCA1-5D5F62C560B7}"/>
+      <thm15:themeFamily xmlns:thm15="http://schemas.microsoft.com/office/thememl/2012/main" xmlns="" name="Frame" id="{F226E7A2-7162-461C-9490-D27D9DC04E43}" vid="{9935E573-C197-41A8-BCA1-5D5F62C560B7}"/>
     </a:ext>
   </a:extLst>
 </a:theme>
@@ -33463,7 +37211,7 @@
     </a:clrScheme>
     <a:fontScheme name="Office">
       <a:majorFont>
-        <a:latin typeface="Calibri Light" panose="020F0302020204030204"/>
+        <a:latin typeface="Calibri Light"/>
         <a:ea typeface=""/>
         <a:cs typeface=""/>
         <a:font script="Jpan" typeface="ＭＳ Ｐゴシック"/>
@@ -33498,7 +37246,7 @@
         <a:font script="Geor" typeface="Sylfaen"/>
       </a:majorFont>
       <a:minorFont>
-        <a:latin typeface="Calibri" panose="020F0502020204030204"/>
+        <a:latin typeface="Calibri"/>
         <a:ea typeface=""/>
         <a:cs typeface=""/>
         <a:font script="Jpan" typeface="ＭＳ Ｐゴシック"/>
@@ -33675,7 +37423,7 @@
   <a:extraClrSchemeLst/>
   <a:extLst>
     <a:ext uri="{05A4C25C-085E-4340-85A3-A5531E510DB2}">
-      <thm15:themeFamily xmlns:thm15="http://schemas.microsoft.com/office/thememl/2012/main" name="Office Theme" id="{62F939B6-93AF-4DB8-9C6B-D6C7DFDC589F}" vid="{4A3C46E8-61CC-4603-A589-7422A47A8E4A}"/>
+      <thm15:themeFamily xmlns:thm15="http://schemas.microsoft.com/office/thememl/2012/main" xmlns="" name="Office Theme" id="{62F939B6-93AF-4DB8-9C6B-D6C7DFDC589F}" vid="{4A3C46E8-61CC-4603-A589-7422A47A8E4A}"/>
     </a:ext>
   </a:extLst>
 </a:theme>

</xml_diff>